<commit_message>
CTECH401 Module 3 tweaks
</commit_message>
<xml_diff>
--- a/ctech401/module_3/CTECH401 Module 3 - Strings.pptx
+++ b/ctech401/module_3/CTECH401 Module 3 - Strings.pptx
@@ -5,37 +5,39 @@
     <p:sldMasterId id="2147483648" r:id="rId1"/>
   </p:sldMasterIdLst>
   <p:notesMasterIdLst>
-    <p:notesMasterId r:id="rId30"/>
+    <p:notesMasterId r:id="rId32"/>
   </p:notesMasterIdLst>
   <p:sldIdLst>
     <p:sldId id="272" r:id="rId2"/>
-    <p:sldId id="273" r:id="rId3"/>
-    <p:sldId id="278" r:id="rId4"/>
-    <p:sldId id="281" r:id="rId5"/>
-    <p:sldId id="279" r:id="rId6"/>
-    <p:sldId id="280" r:id="rId7"/>
-    <p:sldId id="282" r:id="rId8"/>
-    <p:sldId id="274" r:id="rId9"/>
-    <p:sldId id="283" r:id="rId10"/>
-    <p:sldId id="284" r:id="rId11"/>
-    <p:sldId id="285" r:id="rId12"/>
-    <p:sldId id="286" r:id="rId13"/>
-    <p:sldId id="287" r:id="rId14"/>
-    <p:sldId id="288" r:id="rId15"/>
-    <p:sldId id="296" r:id="rId16"/>
-    <p:sldId id="297" r:id="rId17"/>
-    <p:sldId id="289" r:id="rId18"/>
-    <p:sldId id="291" r:id="rId19"/>
-    <p:sldId id="292" r:id="rId20"/>
-    <p:sldId id="293" r:id="rId21"/>
-    <p:sldId id="294" r:id="rId22"/>
-    <p:sldId id="275" r:id="rId23"/>
-    <p:sldId id="298" r:id="rId24"/>
-    <p:sldId id="299" r:id="rId25"/>
-    <p:sldId id="300" r:id="rId26"/>
-    <p:sldId id="301" r:id="rId27"/>
-    <p:sldId id="304" r:id="rId28"/>
-    <p:sldId id="303" r:id="rId29"/>
+    <p:sldId id="305" r:id="rId3"/>
+    <p:sldId id="273" r:id="rId4"/>
+    <p:sldId id="278" r:id="rId5"/>
+    <p:sldId id="281" r:id="rId6"/>
+    <p:sldId id="279" r:id="rId7"/>
+    <p:sldId id="280" r:id="rId8"/>
+    <p:sldId id="282" r:id="rId9"/>
+    <p:sldId id="274" r:id="rId10"/>
+    <p:sldId id="283" r:id="rId11"/>
+    <p:sldId id="284" r:id="rId12"/>
+    <p:sldId id="285" r:id="rId13"/>
+    <p:sldId id="286" r:id="rId14"/>
+    <p:sldId id="287" r:id="rId15"/>
+    <p:sldId id="288" r:id="rId16"/>
+    <p:sldId id="296" r:id="rId17"/>
+    <p:sldId id="297" r:id="rId18"/>
+    <p:sldId id="289" r:id="rId19"/>
+    <p:sldId id="291" r:id="rId20"/>
+    <p:sldId id="292" r:id="rId21"/>
+    <p:sldId id="293" r:id="rId22"/>
+    <p:sldId id="294" r:id="rId23"/>
+    <p:sldId id="275" r:id="rId24"/>
+    <p:sldId id="298" r:id="rId25"/>
+    <p:sldId id="299" r:id="rId26"/>
+    <p:sldId id="300" r:id="rId27"/>
+    <p:sldId id="301" r:id="rId28"/>
+    <p:sldId id="304" r:id="rId29"/>
+    <p:sldId id="303" r:id="rId30"/>
+    <p:sldId id="307" r:id="rId31"/>
   </p:sldIdLst>
   <p:sldSz cx="12192000" cy="6858000"/>
   <p:notesSz cx="6858000" cy="9144000"/>
@@ -235,7 +237,7 @@
           <a:p>
             <a:fld id="{1778ACD8-6E14-F146-9986-2DDB8F18C1FA}" type="datetimeFigureOut">
               <a:rPr lang="en-US" smtClean="0"/>
-              <a:t>6/8/18</a:t>
+              <a:t>2/5/19</a:t>
             </a:fld>
             <a:endParaRPr lang="en-US"/>
           </a:p>
@@ -651,7 +653,7 @@
           <a:p>
             <a:fld id="{C8B14FCA-A5D1-0749-96A8-1423D61C59E6}" type="slidenum">
               <a:rPr lang="en-US" smtClean="0"/>
-              <a:t>2</a:t>
+              <a:t>3</a:t>
             </a:fld>
             <a:endParaRPr lang="en-US"/>
           </a:p>
@@ -735,7 +737,7 @@
           <a:p>
             <a:fld id="{C8B14FCA-A5D1-0749-96A8-1423D61C59E6}" type="slidenum">
               <a:rPr lang="en-US" smtClean="0"/>
-              <a:t>8</a:t>
+              <a:t>9</a:t>
             </a:fld>
             <a:endParaRPr lang="en-US"/>
           </a:p>
@@ -830,7 +832,7 @@
           <a:p>
             <a:fld id="{C8B14FCA-A5D1-0749-96A8-1423D61C59E6}" type="slidenum">
               <a:rPr lang="en-US" smtClean="0"/>
-              <a:t>20</a:t>
+              <a:t>21</a:t>
             </a:fld>
             <a:endParaRPr lang="en-US"/>
           </a:p>
@@ -914,7 +916,7 @@
           <a:p>
             <a:fld id="{C8B14FCA-A5D1-0749-96A8-1423D61C59E6}" type="slidenum">
               <a:rPr lang="en-US" smtClean="0"/>
-              <a:t>22</a:t>
+              <a:t>23</a:t>
             </a:fld>
             <a:endParaRPr lang="en-US"/>
           </a:p>
@@ -2158,10 +2160,10 @@
       </p:grpSpPr>
       <p:sp>
         <p:nvSpPr>
-          <p:cNvPr id="2" name="Content Placeholder 1">
+          <p:cNvPr id="2" name="Text Placeholder 1">
             <a:extLst>
               <a:ext uri="{FF2B5EF4-FFF2-40B4-BE49-F238E27FC236}">
-                <a16:creationId xmlns:a16="http://schemas.microsoft.com/office/drawing/2014/main" id="{1DD66939-BCCF-3E46-BDB0-2A3AE0D03B37}"/>
+                <a16:creationId xmlns:a16="http://schemas.microsoft.com/office/drawing/2014/main" id="{935EC1D1-776B-6F48-B5DE-C5D21AF63E14}"/>
               </a:ext>
             </a:extLst>
           </p:cNvPr>
@@ -2169,7 +2171,7 @@
             <a:spLocks noGrp="1"/>
           </p:cNvSpPr>
           <p:nvPr>
-            <p:ph sz="quarter" idx="10"/>
+            <p:ph type="body" sz="quarter" idx="10"/>
           </p:nvPr>
         </p:nvSpPr>
         <p:spPr/>
@@ -2179,30 +2181,43 @@
           <a:p>
             <a:r>
               <a:rPr lang="en-US" dirty="0"/>
-              <a:t>'hello' + 'goodbye'</a:t>
-            </a:r>
-          </a:p>
-          <a:p>
-            <a:r>
-              <a:rPr lang="en-US" dirty="0"/>
-              <a:t>'hello' + ' ' + 'goodbye'</a:t>
-            </a:r>
-          </a:p>
-          <a:p>
-            <a:r>
-              <a:rPr lang="en-US" dirty="0"/>
-              <a:t>'This is the first half...' + 'and this is the second.'</a:t>
-            </a:r>
-          </a:p>
-          <a:p>
-            <a:endParaRPr lang="en-US" dirty="0"/>
+              <a:t>Now we can do interesting things with strings</a:t>
+            </a:r>
+          </a:p>
+          <a:p>
+            <a:r>
+              <a:rPr lang="en-US" dirty="0"/>
+              <a:t>+ (plus sign) is an </a:t>
+            </a:r>
+            <a:r>
+              <a:rPr lang="en-US" i="1" dirty="0"/>
+              <a:t>addition</a:t>
+            </a:r>
+            <a:r>
+              <a:rPr lang="en-US" dirty="0"/>
+              <a:t> operator for numbers: it combines two numbers into one </a:t>
+            </a:r>
+          </a:p>
+          <a:p>
+            <a:r>
+              <a:rPr lang="en-US" dirty="0"/>
+              <a:t>+ is a </a:t>
+            </a:r>
+            <a:r>
+              <a:rPr lang="en-US" i="1" dirty="0"/>
+              <a:t>concatenation</a:t>
+            </a:r>
+            <a:r>
+              <a:rPr lang="en-US" dirty="0"/>
+              <a:t> operator for strings: it combines two strings into one</a:t>
+            </a:r>
           </a:p>
         </p:txBody>
       </p:sp>
     </p:spTree>
     <p:extLst>
       <p:ext uri="{BB962C8B-B14F-4D97-AF65-F5344CB8AC3E}">
-        <p14:creationId xmlns:p14="http://schemas.microsoft.com/office/powerpoint/2010/main" val="1379750196"/>
+        <p14:creationId xmlns:p14="http://schemas.microsoft.com/office/powerpoint/2010/main" val="2284984678"/>
       </p:ext>
     </p:extLst>
   </p:cSld>
@@ -2231,10 +2246,10 @@
       </p:grpSpPr>
       <p:sp>
         <p:nvSpPr>
-          <p:cNvPr id="2" name="Text Placeholder 1">
+          <p:cNvPr id="2" name="Content Placeholder 1">
             <a:extLst>
               <a:ext uri="{FF2B5EF4-FFF2-40B4-BE49-F238E27FC236}">
-                <a16:creationId xmlns:a16="http://schemas.microsoft.com/office/drawing/2014/main" id="{3A903EAB-9357-A543-8B3B-D104DDECB322}"/>
+                <a16:creationId xmlns:a16="http://schemas.microsoft.com/office/drawing/2014/main" id="{1DD66939-BCCF-3E46-BDB0-2A3AE0D03B37}"/>
               </a:ext>
             </a:extLst>
           </p:cNvPr>
@@ -2242,7 +2257,7 @@
             <a:spLocks noGrp="1"/>
           </p:cNvSpPr>
           <p:nvPr>
-            <p:ph type="body" sz="quarter" idx="10"/>
+            <p:ph sz="quarter" idx="10"/>
           </p:nvPr>
         </p:nvSpPr>
         <p:spPr/>
@@ -2252,37 +2267,30 @@
           <a:p>
             <a:r>
               <a:rPr lang="en-US" dirty="0"/>
-              <a:t>* is a </a:t>
-            </a:r>
-            <a:r>
-              <a:rPr lang="en-US" i="1" dirty="0"/>
-              <a:t>multiplication</a:t>
-            </a:r>
-            <a:r>
-              <a:rPr lang="en-US" dirty="0"/>
-              <a:t> operator for numbers</a:t>
-            </a:r>
-          </a:p>
-          <a:p>
-            <a:r>
-              <a:rPr lang="en-US" dirty="0"/>
-              <a:t>* is a </a:t>
-            </a:r>
-            <a:r>
-              <a:rPr lang="en-US" i="1" dirty="0"/>
-              <a:t>repetition</a:t>
-            </a:r>
-            <a:r>
-              <a:rPr lang="en-US" dirty="0"/>
-              <a:t> operator for strings: it repeats a string some number of times</a:t>
-            </a:r>
+              <a:t>'hello' + 'goodbye'</a:t>
+            </a:r>
+          </a:p>
+          <a:p>
+            <a:r>
+              <a:rPr lang="en-US" dirty="0"/>
+              <a:t>'hello' + ' ' + 'goodbye'</a:t>
+            </a:r>
+          </a:p>
+          <a:p>
+            <a:r>
+              <a:rPr lang="en-US" dirty="0"/>
+              <a:t>'This is the first half...' + 'and this is the second.'</a:t>
+            </a:r>
+          </a:p>
+          <a:p>
+            <a:endParaRPr lang="en-US" dirty="0"/>
           </a:p>
         </p:txBody>
       </p:sp>
     </p:spTree>
     <p:extLst>
       <p:ext uri="{BB962C8B-B14F-4D97-AF65-F5344CB8AC3E}">
-        <p14:creationId xmlns:p14="http://schemas.microsoft.com/office/powerpoint/2010/main" val="420219860"/>
+        <p14:creationId xmlns:p14="http://schemas.microsoft.com/office/powerpoint/2010/main" val="1379750196"/>
       </p:ext>
     </p:extLst>
   </p:cSld>
@@ -2311,10 +2319,10 @@
       </p:grpSpPr>
       <p:sp>
         <p:nvSpPr>
-          <p:cNvPr id="2" name="Content Placeholder 1">
+          <p:cNvPr id="2" name="Text Placeholder 1">
             <a:extLst>
               <a:ext uri="{FF2B5EF4-FFF2-40B4-BE49-F238E27FC236}">
-                <a16:creationId xmlns:a16="http://schemas.microsoft.com/office/drawing/2014/main" id="{04F1B760-8C5E-FD48-B301-8667BD58EA42}"/>
+                <a16:creationId xmlns:a16="http://schemas.microsoft.com/office/drawing/2014/main" id="{3A903EAB-9357-A543-8B3B-D104DDECB322}"/>
               </a:ext>
             </a:extLst>
           </p:cNvPr>
@@ -2322,7 +2330,7 @@
             <a:spLocks noGrp="1"/>
           </p:cNvSpPr>
           <p:nvPr>
-            <p:ph sz="quarter" idx="10"/>
+            <p:ph type="body" sz="quarter" idx="10"/>
           </p:nvPr>
         </p:nvSpPr>
         <p:spPr/>
@@ -2332,57 +2340,29 @@
           <a:p>
             <a:r>
               <a:rPr lang="en-US" dirty="0"/>
-              <a:t>'hello' * 2</a:t>
-            </a:r>
-          </a:p>
-          <a:p>
-            <a:r>
-              <a:rPr lang="en-US" dirty="0"/>
-              <a:t>'A' * 10</a:t>
-            </a:r>
-          </a:p>
-          <a:p>
-            <a:r>
-              <a:rPr lang="en-US" dirty="0"/>
-              <a:t>'</a:t>
-            </a:r>
-            <a:r>
-              <a:rPr lang="en-US" dirty="0" err="1"/>
-              <a:t>ba</a:t>
-            </a:r>
-            <a:r>
-              <a:rPr lang="en-US" dirty="0"/>
-              <a:t>' + '</a:t>
-            </a:r>
-            <a:r>
-              <a:rPr lang="en-US" dirty="0" err="1"/>
-              <a:t>na</a:t>
-            </a:r>
-            <a:r>
-              <a:rPr lang="en-US" dirty="0"/>
-              <a:t>' * 2</a:t>
-            </a:r>
-          </a:p>
-          <a:p>
-            <a:r>
-              <a:rPr lang="en-US" dirty="0"/>
-              <a:t>('</a:t>
-            </a:r>
-            <a:r>
-              <a:rPr lang="en-US" dirty="0" err="1"/>
-              <a:t>ba</a:t>
-            </a:r>
-            <a:r>
-              <a:rPr lang="en-US" dirty="0"/>
-              <a:t>' + '</a:t>
-            </a:r>
-            <a:r>
-              <a:rPr lang="en-US" dirty="0" err="1"/>
-              <a:t>na</a:t>
-            </a:r>
-            <a:r>
-              <a:rPr lang="en-US" dirty="0"/>
-              <a:t>') * 2</a:t>
+              <a:t>* (asterisk) is a </a:t>
+            </a:r>
+            <a:r>
+              <a:rPr lang="en-US" i="1" dirty="0"/>
+              <a:t>multiplication</a:t>
+            </a:r>
+            <a:r>
+              <a:rPr lang="en-US" dirty="0"/>
+              <a:t> operator for numbers</a:t>
+            </a:r>
+          </a:p>
+          <a:p>
+            <a:r>
+              <a:rPr lang="en-US" dirty="0"/>
+              <a:t>* is a </a:t>
+            </a:r>
+            <a:r>
+              <a:rPr lang="en-US" i="1" dirty="0"/>
+              <a:t>repetition</a:t>
+            </a:r>
+            <a:r>
+              <a:rPr lang="en-US" dirty="0"/>
+              <a:t> operator for strings: it repeats a string some number of times</a:t>
             </a:r>
           </a:p>
         </p:txBody>
@@ -2390,7 +2370,7 @@
     </p:spTree>
     <p:extLst>
       <p:ext uri="{BB962C8B-B14F-4D97-AF65-F5344CB8AC3E}">
-        <p14:creationId xmlns:p14="http://schemas.microsoft.com/office/powerpoint/2010/main" val="4057904999"/>
+        <p14:creationId xmlns:p14="http://schemas.microsoft.com/office/powerpoint/2010/main" val="420219860"/>
       </p:ext>
     </p:extLst>
   </p:cSld>
@@ -2419,10 +2399,10 @@
       </p:grpSpPr>
       <p:sp>
         <p:nvSpPr>
-          <p:cNvPr id="2" name="Text Placeholder 1">
+          <p:cNvPr id="2" name="Content Placeholder 1">
             <a:extLst>
               <a:ext uri="{FF2B5EF4-FFF2-40B4-BE49-F238E27FC236}">
-                <a16:creationId xmlns:a16="http://schemas.microsoft.com/office/drawing/2014/main" id="{2751ECF7-9017-4048-8627-BE1D3502970D}"/>
+                <a16:creationId xmlns:a16="http://schemas.microsoft.com/office/drawing/2014/main" id="{04F1B760-8C5E-FD48-B301-8667BD58EA42}"/>
               </a:ext>
             </a:extLst>
           </p:cNvPr>
@@ -2430,7 +2410,7 @@
             <a:spLocks noGrp="1"/>
           </p:cNvSpPr>
           <p:nvPr>
-            <p:ph type="body" sz="quarter" idx="10"/>
+            <p:ph sz="quarter" idx="10"/>
           </p:nvPr>
         </p:nvSpPr>
         <p:spPr/>
@@ -2440,7 +2420,57 @@
           <a:p>
             <a:r>
               <a:rPr lang="en-US" dirty="0"/>
-              <a:t>This is very convenient. But of course some uses of the notation just don't make sense, and Python will complain if you try them.</a:t>
+              <a:t>'hello' * 2</a:t>
+            </a:r>
+          </a:p>
+          <a:p>
+            <a:r>
+              <a:rPr lang="en-US" dirty="0"/>
+              <a:t>'A' * 10</a:t>
+            </a:r>
+          </a:p>
+          <a:p>
+            <a:r>
+              <a:rPr lang="en-US" dirty="0"/>
+              <a:t>'</a:t>
+            </a:r>
+            <a:r>
+              <a:rPr lang="en-US" dirty="0" err="1"/>
+              <a:t>ba</a:t>
+            </a:r>
+            <a:r>
+              <a:rPr lang="en-US" dirty="0"/>
+              <a:t>' + '</a:t>
+            </a:r>
+            <a:r>
+              <a:rPr lang="en-US" dirty="0" err="1"/>
+              <a:t>na</a:t>
+            </a:r>
+            <a:r>
+              <a:rPr lang="en-US" dirty="0"/>
+              <a:t>' * 2</a:t>
+            </a:r>
+          </a:p>
+          <a:p>
+            <a:r>
+              <a:rPr lang="en-US" dirty="0"/>
+              <a:t>('</a:t>
+            </a:r>
+            <a:r>
+              <a:rPr lang="en-US" dirty="0" err="1"/>
+              <a:t>ba</a:t>
+            </a:r>
+            <a:r>
+              <a:rPr lang="en-US" dirty="0"/>
+              <a:t>' + '</a:t>
+            </a:r>
+            <a:r>
+              <a:rPr lang="en-US" dirty="0" err="1"/>
+              <a:t>na</a:t>
+            </a:r>
+            <a:r>
+              <a:rPr lang="en-US" dirty="0"/>
+              <a:t>') * 2</a:t>
             </a:r>
           </a:p>
         </p:txBody>
@@ -2448,7 +2478,7 @@
     </p:spTree>
     <p:extLst>
       <p:ext uri="{BB962C8B-B14F-4D97-AF65-F5344CB8AC3E}">
-        <p14:creationId xmlns:p14="http://schemas.microsoft.com/office/powerpoint/2010/main" val="783509145"/>
+        <p14:creationId xmlns:p14="http://schemas.microsoft.com/office/powerpoint/2010/main" val="4057904999"/>
       </p:ext>
     </p:extLst>
   </p:cSld>
@@ -2477,10 +2507,10 @@
       </p:grpSpPr>
       <p:sp>
         <p:nvSpPr>
-          <p:cNvPr id="2" name="Content Placeholder 1">
+          <p:cNvPr id="2" name="Text Placeholder 1">
             <a:extLst>
               <a:ext uri="{FF2B5EF4-FFF2-40B4-BE49-F238E27FC236}">
-                <a16:creationId xmlns:a16="http://schemas.microsoft.com/office/drawing/2014/main" id="{001F06E3-B445-A942-9D23-1C135B4F3D31}"/>
+                <a16:creationId xmlns:a16="http://schemas.microsoft.com/office/drawing/2014/main" id="{2751ECF7-9017-4048-8627-BE1D3502970D}"/>
               </a:ext>
             </a:extLst>
           </p:cNvPr>
@@ -2488,7 +2518,7 @@
             <a:spLocks noGrp="1"/>
           </p:cNvSpPr>
           <p:nvPr>
-            <p:ph sz="quarter" idx="10"/>
+            <p:ph type="body" sz="quarter" idx="10"/>
           </p:nvPr>
         </p:nvSpPr>
         <p:spPr/>
@@ -2498,54 +2528,7 @@
           <a:p>
             <a:r>
               <a:rPr lang="en-US" dirty="0"/>
-              <a:t>'</a:t>
-            </a:r>
-            <a:r>
-              <a:rPr lang="en-US" dirty="0" err="1"/>
-              <a:t>ba</a:t>
-            </a:r>
-            <a:r>
-              <a:rPr lang="en-US" dirty="0"/>
-              <a:t>' + 20</a:t>
-            </a:r>
-          </a:p>
-          <a:p>
-            <a:r>
-              <a:rPr lang="en-US" dirty="0"/>
-              <a:t>'</a:t>
-            </a:r>
-            <a:r>
-              <a:rPr lang="en-US" dirty="0" err="1"/>
-              <a:t>ba</a:t>
-            </a:r>
-            <a:r>
-              <a:rPr lang="en-US" dirty="0"/>
-              <a:t>' * '</a:t>
-            </a:r>
-            <a:r>
-              <a:rPr lang="en-US" dirty="0" err="1"/>
-              <a:t>na</a:t>
-            </a:r>
-            <a:r>
-              <a:rPr lang="en-US" dirty="0"/>
-              <a:t>'</a:t>
-            </a:r>
-          </a:p>
-          <a:p>
-            <a:endParaRPr lang="en-US" dirty="0"/>
-          </a:p>
-          <a:p>
-            <a:r>
-              <a:rPr lang="en-US" dirty="0"/>
-              <a:t>You can't </a:t>
-            </a:r>
-            <a:r>
-              <a:rPr lang="en-US" dirty="0" err="1"/>
-              <a:t>concatente</a:t>
-            </a:r>
-            <a:r>
-              <a:rPr lang="en-US" dirty="0"/>
-              <a:t> strings and numbers; you can't multiply strings</a:t>
+              <a:t>This is very convenient. But of course some uses of the notation just don't make sense, and Python will complain if you try them.</a:t>
             </a:r>
           </a:p>
         </p:txBody>
@@ -2553,7 +2536,7 @@
     </p:spTree>
     <p:extLst>
       <p:ext uri="{BB962C8B-B14F-4D97-AF65-F5344CB8AC3E}">
-        <p14:creationId xmlns:p14="http://schemas.microsoft.com/office/powerpoint/2010/main" val="3055458659"/>
+        <p14:creationId xmlns:p14="http://schemas.microsoft.com/office/powerpoint/2010/main" val="783509145"/>
       </p:ext>
     </p:extLst>
   </p:cSld>
@@ -2582,10 +2565,10 @@
       </p:grpSpPr>
       <p:sp>
         <p:nvSpPr>
-          <p:cNvPr id="2" name="Text Placeholder 1">
+          <p:cNvPr id="2" name="Content Placeholder 1">
             <a:extLst>
               <a:ext uri="{FF2B5EF4-FFF2-40B4-BE49-F238E27FC236}">
-                <a16:creationId xmlns:a16="http://schemas.microsoft.com/office/drawing/2014/main" id="{1C036D4F-643D-EB44-9BC4-7D6CFECAA410}"/>
+                <a16:creationId xmlns:a16="http://schemas.microsoft.com/office/drawing/2014/main" id="{001F06E3-B445-A942-9D23-1C135B4F3D31}"/>
               </a:ext>
             </a:extLst>
           </p:cNvPr>
@@ -2593,7 +2576,7 @@
             <a:spLocks noGrp="1"/>
           </p:cNvSpPr>
           <p:nvPr>
-            <p:ph type="body" sz="quarter" idx="10"/>
+            <p:ph sz="quarter" idx="10"/>
           </p:nvPr>
         </p:nvSpPr>
         <p:spPr/>
@@ -2603,7 +2586,46 @@
           <a:p>
             <a:r>
               <a:rPr lang="en-US" dirty="0"/>
-              <a:t>You can also use the string operators to work with variables</a:t>
+              <a:t>'</a:t>
+            </a:r>
+            <a:r>
+              <a:rPr lang="en-US" dirty="0" err="1"/>
+              <a:t>ba</a:t>
+            </a:r>
+            <a:r>
+              <a:rPr lang="en-US" dirty="0"/>
+              <a:t>' + 20</a:t>
+            </a:r>
+          </a:p>
+          <a:p>
+            <a:r>
+              <a:rPr lang="en-US" dirty="0"/>
+              <a:t>'</a:t>
+            </a:r>
+            <a:r>
+              <a:rPr lang="en-US" dirty="0" err="1"/>
+              <a:t>ba</a:t>
+            </a:r>
+            <a:r>
+              <a:rPr lang="en-US" dirty="0"/>
+              <a:t>' * '</a:t>
+            </a:r>
+            <a:r>
+              <a:rPr lang="en-US" dirty="0" err="1"/>
+              <a:t>na</a:t>
+            </a:r>
+            <a:r>
+              <a:rPr lang="en-US" dirty="0"/>
+              <a:t>'</a:t>
+            </a:r>
+          </a:p>
+          <a:p>
+            <a:endParaRPr lang="en-US" dirty="0"/>
+          </a:p>
+          <a:p>
+            <a:r>
+              <a:rPr lang="en-US" dirty="0"/>
+              <a:t>You can't concatenate strings and numbers; you can't multiply strings</a:t>
             </a:r>
           </a:p>
         </p:txBody>
@@ -2611,7 +2633,7 @@
     </p:spTree>
     <p:extLst>
       <p:ext uri="{BB962C8B-B14F-4D97-AF65-F5344CB8AC3E}">
-        <p14:creationId xmlns:p14="http://schemas.microsoft.com/office/powerpoint/2010/main" val="3278686461"/>
+        <p14:creationId xmlns:p14="http://schemas.microsoft.com/office/powerpoint/2010/main" val="3055458659"/>
       </p:ext>
     </p:extLst>
   </p:cSld>
@@ -2640,10 +2662,10 @@
       </p:grpSpPr>
       <p:sp>
         <p:nvSpPr>
-          <p:cNvPr id="2" name="Content Placeholder 1">
+          <p:cNvPr id="2" name="Text Placeholder 1">
             <a:extLst>
               <a:ext uri="{FF2B5EF4-FFF2-40B4-BE49-F238E27FC236}">
-                <a16:creationId xmlns:a16="http://schemas.microsoft.com/office/drawing/2014/main" id="{F33B19DD-196E-9A4C-97D5-489B5949AAED}"/>
+                <a16:creationId xmlns:a16="http://schemas.microsoft.com/office/drawing/2014/main" id="{1C036D4F-643D-EB44-9BC4-7D6CFECAA410}"/>
               </a:ext>
             </a:extLst>
           </p:cNvPr>
@@ -2651,7 +2673,7 @@
             <a:spLocks noGrp="1"/>
           </p:cNvSpPr>
           <p:nvPr>
-            <p:ph sz="quarter" idx="10"/>
+            <p:ph type="body" sz="quarter" idx="10"/>
           </p:nvPr>
         </p:nvSpPr>
         <p:spPr/>
@@ -2661,41 +2683,7 @@
           <a:p>
             <a:r>
               <a:rPr lang="en-US" dirty="0"/>
-              <a:t>s = '</a:t>
-            </a:r>
-            <a:r>
-              <a:rPr lang="en-US" dirty="0" err="1"/>
-              <a:t>ba</a:t>
-            </a:r>
-            <a:r>
-              <a:rPr lang="en-US" dirty="0"/>
-              <a:t>'</a:t>
-            </a:r>
-          </a:p>
-          <a:p>
-            <a:r>
-              <a:rPr lang="en-US" dirty="0"/>
-              <a:t>t = '</a:t>
-            </a:r>
-            <a:r>
-              <a:rPr lang="en-US" dirty="0" err="1"/>
-              <a:t>na</a:t>
-            </a:r>
-            <a:r>
-              <a:rPr lang="en-US" dirty="0"/>
-              <a:t>'</a:t>
-            </a:r>
-          </a:p>
-          <a:p>
-            <a:r>
-              <a:rPr lang="en-US" dirty="0"/>
-              <a:t>u = s + (t * 2)</a:t>
-            </a:r>
-          </a:p>
-          <a:p>
-            <a:r>
-              <a:rPr lang="en-US" dirty="0"/>
-              <a:t>u</a:t>
+              <a:t>You can also use the string operators to work with variables</a:t>
             </a:r>
           </a:p>
         </p:txBody>
@@ -2703,7 +2691,7 @@
     </p:spTree>
     <p:extLst>
       <p:ext uri="{BB962C8B-B14F-4D97-AF65-F5344CB8AC3E}">
-        <p14:creationId xmlns:p14="http://schemas.microsoft.com/office/powerpoint/2010/main" val="1653893802"/>
+        <p14:creationId xmlns:p14="http://schemas.microsoft.com/office/powerpoint/2010/main" val="3278686461"/>
       </p:ext>
     </p:extLst>
   </p:cSld>
@@ -2732,10 +2720,10 @@
       </p:grpSpPr>
       <p:sp>
         <p:nvSpPr>
-          <p:cNvPr id="2" name="Text Placeholder 1">
+          <p:cNvPr id="2" name="Content Placeholder 1">
             <a:extLst>
               <a:ext uri="{FF2B5EF4-FFF2-40B4-BE49-F238E27FC236}">
-                <a16:creationId xmlns:a16="http://schemas.microsoft.com/office/drawing/2014/main" id="{B89F25D5-6020-3B40-813B-20D5627B9C32}"/>
+                <a16:creationId xmlns:a16="http://schemas.microsoft.com/office/drawing/2014/main" id="{F33B19DD-196E-9A4C-97D5-489B5949AAED}"/>
               </a:ext>
             </a:extLst>
           </p:cNvPr>
@@ -2743,7 +2731,7 @@
             <a:spLocks noGrp="1"/>
           </p:cNvSpPr>
           <p:nvPr>
-            <p:ph type="body" sz="quarter" idx="10"/>
+            <p:ph sz="quarter" idx="10"/>
           </p:nvPr>
         </p:nvSpPr>
         <p:spPr/>
@@ -2753,18 +2741,49 @@
           <a:p>
             <a:r>
               <a:rPr lang="en-US" dirty="0"/>
-              <a:t>With the string operators, we can rewrite the input name program so that it formats its output nicely on one line</a:t>
-            </a:r>
-          </a:p>
-          <a:p>
-            <a:endParaRPr lang="en-US" dirty="0"/>
+              <a:t>s = '</a:t>
+            </a:r>
+            <a:r>
+              <a:rPr lang="en-US" dirty="0" err="1"/>
+              <a:t>ba</a:t>
+            </a:r>
+            <a:r>
+              <a:rPr lang="en-US" dirty="0"/>
+              <a:t>'</a:t>
+            </a:r>
+          </a:p>
+          <a:p>
+            <a:r>
+              <a:rPr lang="en-US" dirty="0"/>
+              <a:t>t = '</a:t>
+            </a:r>
+            <a:r>
+              <a:rPr lang="en-US" dirty="0" err="1"/>
+              <a:t>na</a:t>
+            </a:r>
+            <a:r>
+              <a:rPr lang="en-US" dirty="0"/>
+              <a:t>'</a:t>
+            </a:r>
+          </a:p>
+          <a:p>
+            <a:r>
+              <a:rPr lang="en-US" dirty="0"/>
+              <a:t>u = s + (t * 2)</a:t>
+            </a:r>
+          </a:p>
+          <a:p>
+            <a:r>
+              <a:rPr lang="en-US" dirty="0"/>
+              <a:t>u</a:t>
+            </a:r>
           </a:p>
         </p:txBody>
       </p:sp>
     </p:spTree>
     <p:extLst>
       <p:ext uri="{BB962C8B-B14F-4D97-AF65-F5344CB8AC3E}">
-        <p14:creationId xmlns:p14="http://schemas.microsoft.com/office/powerpoint/2010/main" val="28561232"/>
+        <p14:creationId xmlns:p14="http://schemas.microsoft.com/office/powerpoint/2010/main" val="1653893802"/>
       </p:ext>
     </p:extLst>
   </p:cSld>
@@ -2796,7 +2815,7 @@
           <p:cNvPr id="2" name="Text Placeholder 1">
             <a:extLst>
               <a:ext uri="{FF2B5EF4-FFF2-40B4-BE49-F238E27FC236}">
-                <a16:creationId xmlns:a16="http://schemas.microsoft.com/office/drawing/2014/main" id="{143334C9-21EC-7C4A-BEDD-E621204B91E8}"/>
+                <a16:creationId xmlns:a16="http://schemas.microsoft.com/office/drawing/2014/main" id="{B89F25D5-6020-3B40-813B-20D5627B9C32}"/>
               </a:ext>
             </a:extLst>
           </p:cNvPr>
@@ -2804,163 +2823,28 @@
             <a:spLocks noGrp="1"/>
           </p:cNvSpPr>
           <p:nvPr>
-            <p:ph type="body" sz="quarter" idx="11"/>
-          </p:nvPr>
-        </p:nvSpPr>
-        <p:spPr>
-          <a:xfrm>
-            <a:off x="5892800" y="359330"/>
-            <a:ext cx="6011900" cy="1340495"/>
-          </a:xfrm>
-        </p:spPr>
+            <p:ph type="body" sz="quarter" idx="10"/>
+          </p:nvPr>
+        </p:nvSpPr>
+        <p:spPr/>
         <p:txBody>
           <a:bodyPr/>
           <a:lstStyle/>
           <a:p>
             <a:r>
-              <a:rPr lang="en-US" b="1" dirty="0">
-                <a:solidFill>
-                  <a:srgbClr val="000000"/>
-                </a:solidFill>
-                <a:latin typeface="Consolas" panose="020B0609020204030204" pitchFamily="49" charset="0"/>
-              </a:rPr>
-              <a:t>n </a:t>
-            </a:r>
-            <a:r>
-              <a:rPr lang="en-US" b="1" dirty="0">
-                <a:solidFill>
-                  <a:srgbClr val="CE5C00"/>
-                </a:solidFill>
-                <a:latin typeface="Consolas" panose="020B0609020204030204" pitchFamily="49" charset="0"/>
-              </a:rPr>
-              <a:t>= </a:t>
-            </a:r>
-            <a:r>
-              <a:rPr lang="en-US" b="1" dirty="0">
-                <a:solidFill>
-                  <a:srgbClr val="204A87"/>
-                </a:solidFill>
-                <a:latin typeface="Consolas" panose="020B0609020204030204" pitchFamily="49" charset="0"/>
-              </a:rPr>
-              <a:t>input</a:t>
-            </a:r>
-            <a:r>
-              <a:rPr lang="en-US" b="1" dirty="0">
-                <a:solidFill>
-                  <a:srgbClr val="000000"/>
-                </a:solidFill>
-                <a:latin typeface="Consolas" panose="020B0609020204030204" pitchFamily="49" charset="0"/>
-              </a:rPr>
-              <a:t>(</a:t>
-            </a:r>
-            <a:r>
-              <a:rPr lang="en-US" b="1" dirty="0">
-                <a:solidFill>
-                  <a:srgbClr val="4E9A06"/>
-                </a:solidFill>
-                <a:latin typeface="Consolas" panose="020B0609020204030204" pitchFamily="49" charset="0"/>
-              </a:rPr>
-              <a:t>'What is your name? '</a:t>
-            </a:r>
-            <a:r>
-              <a:rPr lang="en-US" b="1" dirty="0">
-                <a:solidFill>
-                  <a:srgbClr val="000000"/>
-                </a:solidFill>
-                <a:latin typeface="Consolas" panose="020B0609020204030204" pitchFamily="49" charset="0"/>
-              </a:rPr>
-              <a:t>)</a:t>
-            </a:r>
-          </a:p>
-          <a:p>
-            <a:r>
-              <a:rPr lang="en-US" b="1" dirty="0">
-                <a:solidFill>
-                  <a:srgbClr val="204A87"/>
-                </a:solidFill>
-                <a:latin typeface="Consolas" panose="020B0609020204030204" pitchFamily="49" charset="0"/>
-              </a:rPr>
-              <a:t>print</a:t>
-            </a:r>
-            <a:r>
-              <a:rPr lang="en-US" b="1" dirty="0">
-                <a:solidFill>
-                  <a:srgbClr val="000000"/>
-                </a:solidFill>
-                <a:latin typeface="Consolas" panose="020B0609020204030204" pitchFamily="49" charset="0"/>
-              </a:rPr>
-              <a:t>(</a:t>
-            </a:r>
-            <a:r>
-              <a:rPr lang="en-US" b="1" dirty="0">
-                <a:solidFill>
-                  <a:srgbClr val="4E9A06"/>
-                </a:solidFill>
-                <a:latin typeface="Consolas" panose="020B0609020204030204" pitchFamily="49" charset="0"/>
-              </a:rPr>
-              <a:t>'Thank you. Your name is:'</a:t>
-            </a:r>
-            <a:r>
-              <a:rPr lang="en-US" b="1" dirty="0">
-                <a:solidFill>
-                  <a:srgbClr val="000000"/>
-                </a:solidFill>
-                <a:latin typeface="Consolas" panose="020B0609020204030204" pitchFamily="49" charset="0"/>
-              </a:rPr>
-              <a:t>)</a:t>
-            </a:r>
-          </a:p>
-          <a:p>
-            <a:r>
-              <a:rPr lang="en-US" b="1" dirty="0">
-                <a:solidFill>
-                  <a:srgbClr val="204A87"/>
-                </a:solidFill>
-                <a:latin typeface="Consolas" panose="020B0609020204030204" pitchFamily="49" charset="0"/>
-              </a:rPr>
-              <a:t>print</a:t>
-            </a:r>
-            <a:r>
-              <a:rPr lang="en-US" b="1" dirty="0">
-                <a:solidFill>
-                  <a:srgbClr val="000000"/>
-                </a:solidFill>
-                <a:latin typeface="Consolas" panose="020B0609020204030204" pitchFamily="49" charset="0"/>
-              </a:rPr>
-              <a:t>(n)</a:t>
-            </a:r>
-          </a:p>
-        </p:txBody>
-      </p:sp>
-      <p:sp>
-        <p:nvSpPr>
-          <p:cNvPr id="3" name="Text Placeholder 2">
-            <a:extLst>
-              <a:ext uri="{FF2B5EF4-FFF2-40B4-BE49-F238E27FC236}">
-                <a16:creationId xmlns:a16="http://schemas.microsoft.com/office/drawing/2014/main" id="{D9FE3D42-B435-EE4D-82E1-D59467403AD0}"/>
-              </a:ext>
-            </a:extLst>
-          </p:cNvPr>
-          <p:cNvSpPr>
-            <a:spLocks noGrp="1"/>
-          </p:cNvSpPr>
-          <p:nvPr>
-            <p:ph type="body" sz="quarter" idx="12"/>
-          </p:nvPr>
-        </p:nvSpPr>
-        <p:spPr/>
-        <p:txBody>
-          <a:bodyPr/>
-          <a:lstStyle/>
-          <a:p>
-            <a:endParaRPr lang="en-US"/>
+              <a:rPr lang="en-US" dirty="0"/>
+              <a:t>With the string operators, we can rewrite the input name program so that it formats its output nicely on one line</a:t>
+            </a:r>
+          </a:p>
+          <a:p>
+            <a:endParaRPr lang="en-US" dirty="0"/>
           </a:p>
         </p:txBody>
       </p:sp>
     </p:spTree>
     <p:extLst>
       <p:ext uri="{BB962C8B-B14F-4D97-AF65-F5344CB8AC3E}">
-        <p14:creationId xmlns:p14="http://schemas.microsoft.com/office/powerpoint/2010/main" val="3278789347"/>
+        <p14:creationId xmlns:p14="http://schemas.microsoft.com/office/powerpoint/2010/main" val="28561232"/>
       </p:ext>
     </p:extLst>
   </p:cSld>
@@ -2989,10 +2873,10 @@
       </p:grpSpPr>
       <p:sp>
         <p:nvSpPr>
-          <p:cNvPr id="2" name="Content Placeholder 1">
+          <p:cNvPr id="2" name="Text Placeholder 1">
             <a:extLst>
               <a:ext uri="{FF2B5EF4-FFF2-40B4-BE49-F238E27FC236}">
-                <a16:creationId xmlns:a16="http://schemas.microsoft.com/office/drawing/2014/main" id="{1C972210-79C4-C941-A822-3ACD2D0F2D08}"/>
+                <a16:creationId xmlns:a16="http://schemas.microsoft.com/office/drawing/2014/main" id="{143334C9-21EC-7C4A-BEDD-E621204B91E8}"/>
               </a:ext>
             </a:extLst>
           </p:cNvPr>
@@ -3000,30 +2884,163 @@
             <a:spLocks noGrp="1"/>
           </p:cNvSpPr>
           <p:nvPr>
-            <p:ph sz="quarter" idx="10"/>
-          </p:nvPr>
-        </p:nvSpPr>
-        <p:spPr/>
+            <p:ph type="body" sz="quarter" idx="11"/>
+          </p:nvPr>
+        </p:nvSpPr>
+        <p:spPr>
+          <a:xfrm>
+            <a:off x="5892800" y="359330"/>
+            <a:ext cx="6011900" cy="1340495"/>
+          </a:xfrm>
+        </p:spPr>
         <p:txBody>
           <a:bodyPr/>
           <a:lstStyle/>
           <a:p>
             <a:r>
-              <a:rPr lang="en-US" dirty="0"/>
-              <a:t>python input-</a:t>
-            </a:r>
-            <a:r>
-              <a:rPr lang="en-US" dirty="0" err="1"/>
-              <a:t>name.py</a:t>
-            </a:r>
-            <a:endParaRPr lang="en-US" dirty="0"/>
+              <a:rPr lang="en-US" b="1" dirty="0">
+                <a:solidFill>
+                  <a:srgbClr val="000000"/>
+                </a:solidFill>
+                <a:latin typeface="Consolas" panose="020B0609020204030204" pitchFamily="49" charset="0"/>
+              </a:rPr>
+              <a:t>n </a:t>
+            </a:r>
+            <a:r>
+              <a:rPr lang="en-US" b="1" dirty="0">
+                <a:solidFill>
+                  <a:srgbClr val="CE5C00"/>
+                </a:solidFill>
+                <a:latin typeface="Consolas" panose="020B0609020204030204" pitchFamily="49" charset="0"/>
+              </a:rPr>
+              <a:t>= </a:t>
+            </a:r>
+            <a:r>
+              <a:rPr lang="en-US" b="1" dirty="0">
+                <a:solidFill>
+                  <a:srgbClr val="204A87"/>
+                </a:solidFill>
+                <a:latin typeface="Consolas" panose="020B0609020204030204" pitchFamily="49" charset="0"/>
+              </a:rPr>
+              <a:t>input</a:t>
+            </a:r>
+            <a:r>
+              <a:rPr lang="en-US" b="1" dirty="0">
+                <a:solidFill>
+                  <a:srgbClr val="000000"/>
+                </a:solidFill>
+                <a:latin typeface="Consolas" panose="020B0609020204030204" pitchFamily="49" charset="0"/>
+              </a:rPr>
+              <a:t>(</a:t>
+            </a:r>
+            <a:r>
+              <a:rPr lang="en-US" b="1" dirty="0">
+                <a:solidFill>
+                  <a:srgbClr val="4E9A06"/>
+                </a:solidFill>
+                <a:latin typeface="Consolas" panose="020B0609020204030204" pitchFamily="49" charset="0"/>
+              </a:rPr>
+              <a:t>'What is your name? '</a:t>
+            </a:r>
+            <a:r>
+              <a:rPr lang="en-US" b="1" dirty="0">
+                <a:solidFill>
+                  <a:srgbClr val="000000"/>
+                </a:solidFill>
+                <a:latin typeface="Consolas" panose="020B0609020204030204" pitchFamily="49" charset="0"/>
+              </a:rPr>
+              <a:t>)</a:t>
+            </a:r>
+          </a:p>
+          <a:p>
+            <a:r>
+              <a:rPr lang="en-US" b="1" dirty="0">
+                <a:solidFill>
+                  <a:srgbClr val="204A87"/>
+                </a:solidFill>
+                <a:latin typeface="Consolas" panose="020B0609020204030204" pitchFamily="49" charset="0"/>
+              </a:rPr>
+              <a:t>print</a:t>
+            </a:r>
+            <a:r>
+              <a:rPr lang="en-US" b="1" dirty="0">
+                <a:solidFill>
+                  <a:srgbClr val="000000"/>
+                </a:solidFill>
+                <a:latin typeface="Consolas" panose="020B0609020204030204" pitchFamily="49" charset="0"/>
+              </a:rPr>
+              <a:t>(</a:t>
+            </a:r>
+            <a:r>
+              <a:rPr lang="en-US" b="1" dirty="0">
+                <a:solidFill>
+                  <a:srgbClr val="4E9A06"/>
+                </a:solidFill>
+                <a:latin typeface="Consolas" panose="020B0609020204030204" pitchFamily="49" charset="0"/>
+              </a:rPr>
+              <a:t>'Thank you. Your name is:'</a:t>
+            </a:r>
+            <a:r>
+              <a:rPr lang="en-US" b="1" dirty="0">
+                <a:solidFill>
+                  <a:srgbClr val="000000"/>
+                </a:solidFill>
+                <a:latin typeface="Consolas" panose="020B0609020204030204" pitchFamily="49" charset="0"/>
+              </a:rPr>
+              <a:t>)</a:t>
+            </a:r>
+          </a:p>
+          <a:p>
+            <a:r>
+              <a:rPr lang="en-US" b="1" dirty="0">
+                <a:solidFill>
+                  <a:srgbClr val="204A87"/>
+                </a:solidFill>
+                <a:latin typeface="Consolas" panose="020B0609020204030204" pitchFamily="49" charset="0"/>
+              </a:rPr>
+              <a:t>print</a:t>
+            </a:r>
+            <a:r>
+              <a:rPr lang="en-US" b="1" dirty="0">
+                <a:solidFill>
+                  <a:srgbClr val="000000"/>
+                </a:solidFill>
+                <a:latin typeface="Consolas" panose="020B0609020204030204" pitchFamily="49" charset="0"/>
+              </a:rPr>
+              <a:t>(n)</a:t>
+            </a:r>
+          </a:p>
+        </p:txBody>
+      </p:sp>
+      <p:sp>
+        <p:nvSpPr>
+          <p:cNvPr id="3" name="Text Placeholder 2">
+            <a:extLst>
+              <a:ext uri="{FF2B5EF4-FFF2-40B4-BE49-F238E27FC236}">
+                <a16:creationId xmlns:a16="http://schemas.microsoft.com/office/drawing/2014/main" id="{D9FE3D42-B435-EE4D-82E1-D59467403AD0}"/>
+              </a:ext>
+            </a:extLst>
+          </p:cNvPr>
+          <p:cNvSpPr>
+            <a:spLocks noGrp="1"/>
+          </p:cNvSpPr>
+          <p:nvPr>
+            <p:ph type="body" sz="quarter" idx="12"/>
+          </p:nvPr>
+        </p:nvSpPr>
+        <p:spPr/>
+        <p:txBody>
+          <a:bodyPr/>
+          <a:lstStyle/>
+          <a:p>
+            <a:endParaRPr lang="en-US"/>
           </a:p>
         </p:txBody>
       </p:sp>
     </p:spTree>
     <p:extLst>
       <p:ext uri="{BB962C8B-B14F-4D97-AF65-F5344CB8AC3E}">
-        <p14:creationId xmlns:p14="http://schemas.microsoft.com/office/powerpoint/2010/main" val="1066617227"/>
+        <p14:creationId xmlns:p14="http://schemas.microsoft.com/office/powerpoint/2010/main" val="3278789347"/>
       </p:ext>
     </p:extLst>
   </p:cSld>
@@ -3055,7 +3072,7 @@
           <p:cNvPr id="2" name="Text Placeholder 1">
             <a:extLst>
               <a:ext uri="{FF2B5EF4-FFF2-40B4-BE49-F238E27FC236}">
-                <a16:creationId xmlns:a16="http://schemas.microsoft.com/office/drawing/2014/main" id="{06E88012-EA37-4246-8DA9-19B4AF6595E1}"/>
+                <a16:creationId xmlns:a16="http://schemas.microsoft.com/office/drawing/2014/main" id="{A7E5026B-3DBD-B64B-8BF4-C92D86DAB4BE}"/>
               </a:ext>
             </a:extLst>
           </p:cNvPr>
@@ -3066,43 +3083,20 @@
             <p:ph type="body" sz="quarter" idx="10"/>
           </p:nvPr>
         </p:nvSpPr>
-        <p:spPr>
-          <a:xfrm>
-            <a:off x="3344863" y="1143000"/>
-            <a:ext cx="7593012" cy="2177006"/>
-          </a:xfrm>
-        </p:spPr>
+        <p:spPr/>
         <p:txBody>
           <a:bodyPr/>
           <a:lstStyle/>
           <a:p>
             <a:r>
-              <a:rPr lang="en-US" dirty="0">
-                <a:solidFill>
-                  <a:schemeClr val="bg1"/>
-                </a:solidFill>
-              </a:rPr>
-              <a:t>3</a:t>
-            </a:r>
-          </a:p>
-          <a:p>
-            <a:r>
-              <a:rPr lang="en-US" dirty="0">
-                <a:solidFill>
-                  <a:schemeClr val="bg1"/>
-                </a:solidFill>
-              </a:rPr>
-              <a:t>CTECH401_M3_02</a:t>
-            </a:r>
-          </a:p>
-          <a:p>
-            <a:r>
-              <a:rPr lang="en-US" dirty="0">
-                <a:solidFill>
-                  <a:schemeClr val="bg1"/>
-                </a:solidFill>
-              </a:rPr>
-              <a:t>Strings</a:t>
+              <a:rPr lang="en-US" dirty="0"/>
+              <a:t>In this module, we'll take a closer look at Python's support for text.</a:t>
+            </a:r>
+          </a:p>
+          <a:p>
+            <a:r>
+              <a:rPr lang="en-US" dirty="0"/>
+              <a:t>That's right, we'll talk more about strings: what they are and how to work with them.</a:t>
             </a:r>
           </a:p>
         </p:txBody>
@@ -3110,7 +3104,7 @@
     </p:spTree>
     <p:extLst>
       <p:ext uri="{BB962C8B-B14F-4D97-AF65-F5344CB8AC3E}">
-        <p14:creationId xmlns:p14="http://schemas.microsoft.com/office/powerpoint/2010/main" val="3710759850"/>
+        <p14:creationId xmlns:p14="http://schemas.microsoft.com/office/powerpoint/2010/main" val="3449524369"/>
       </p:ext>
     </p:extLst>
   </p:cSld>
@@ -3139,10 +3133,10 @@
       </p:grpSpPr>
       <p:sp>
         <p:nvSpPr>
-          <p:cNvPr id="2" name="Text Placeholder 1">
+          <p:cNvPr id="2" name="Content Placeholder 1">
             <a:extLst>
               <a:ext uri="{FF2B5EF4-FFF2-40B4-BE49-F238E27FC236}">
-                <a16:creationId xmlns:a16="http://schemas.microsoft.com/office/drawing/2014/main" id="{41DB1EB8-F065-FF4C-A169-C9FA64B4C154}"/>
+                <a16:creationId xmlns:a16="http://schemas.microsoft.com/office/drawing/2014/main" id="{1C972210-79C4-C941-A822-3ACD2D0F2D08}"/>
               </a:ext>
             </a:extLst>
           </p:cNvPr>
@@ -3150,7 +3144,7 @@
             <a:spLocks noGrp="1"/>
           </p:cNvSpPr>
           <p:nvPr>
-            <p:ph type="body" sz="quarter" idx="11"/>
+            <p:ph sz="quarter" idx="10"/>
           </p:nvPr>
         </p:nvSpPr>
         <p:spPr/>
@@ -3159,138 +3153,21 @@
           <a:lstStyle/>
           <a:p>
             <a:r>
-              <a:rPr lang="en-US" b="1" dirty="0">
-                <a:solidFill>
-                  <a:srgbClr val="000000"/>
-                </a:solidFill>
-                <a:latin typeface="Consolas" panose="020B0609020204030204" pitchFamily="49" charset="0"/>
-              </a:rPr>
-              <a:t>n </a:t>
-            </a:r>
-            <a:r>
-              <a:rPr lang="en-US" b="1" dirty="0">
-                <a:solidFill>
-                  <a:srgbClr val="CE5C00"/>
-                </a:solidFill>
-                <a:latin typeface="Consolas" panose="020B0609020204030204" pitchFamily="49" charset="0"/>
-              </a:rPr>
-              <a:t>= </a:t>
-            </a:r>
-            <a:r>
-              <a:rPr lang="en-US" b="1" dirty="0">
-                <a:solidFill>
-                  <a:srgbClr val="204A87"/>
-                </a:solidFill>
-                <a:latin typeface="Consolas" panose="020B0609020204030204" pitchFamily="49" charset="0"/>
-              </a:rPr>
-              <a:t>input</a:t>
-            </a:r>
-            <a:r>
-              <a:rPr lang="en-US" b="1" dirty="0">
-                <a:solidFill>
-                  <a:srgbClr val="000000"/>
-                </a:solidFill>
-                <a:latin typeface="Consolas" panose="020B0609020204030204" pitchFamily="49" charset="0"/>
-              </a:rPr>
-              <a:t>(</a:t>
-            </a:r>
-            <a:r>
-              <a:rPr lang="en-US" b="1" dirty="0">
-                <a:solidFill>
-                  <a:srgbClr val="4E9A06"/>
-                </a:solidFill>
-                <a:latin typeface="Consolas" panose="020B0609020204030204" pitchFamily="49" charset="0"/>
-              </a:rPr>
-              <a:t>'What is your name? '</a:t>
-            </a:r>
-            <a:r>
-              <a:rPr lang="en-US" b="1" dirty="0">
-                <a:solidFill>
-                  <a:srgbClr val="000000"/>
-                </a:solidFill>
-                <a:latin typeface="Consolas" panose="020B0609020204030204" pitchFamily="49" charset="0"/>
-              </a:rPr>
-              <a:t>)</a:t>
-            </a:r>
-          </a:p>
-          <a:p>
-            <a:r>
-              <a:rPr lang="en-US" b="1" dirty="0">
-                <a:solidFill>
-                  <a:srgbClr val="204A87"/>
-                </a:solidFill>
-                <a:latin typeface="Consolas" panose="020B0609020204030204" pitchFamily="49" charset="0"/>
-              </a:rPr>
-              <a:t>print</a:t>
-            </a:r>
-            <a:r>
-              <a:rPr lang="en-US" b="1" dirty="0">
-                <a:solidFill>
-                  <a:srgbClr val="000000"/>
-                </a:solidFill>
-                <a:latin typeface="Consolas" panose="020B0609020204030204" pitchFamily="49" charset="0"/>
-              </a:rPr>
-              <a:t>(</a:t>
-            </a:r>
-            <a:r>
-              <a:rPr lang="en-US" b="1" dirty="0">
-                <a:solidFill>
-                  <a:srgbClr val="4E9A06"/>
-                </a:solidFill>
-                <a:latin typeface="Consolas" panose="020B0609020204030204" pitchFamily="49" charset="0"/>
-              </a:rPr>
-              <a:t>'Thank you. Your name is: ' </a:t>
-            </a:r>
-            <a:r>
-              <a:rPr lang="en-US" b="1" dirty="0">
-                <a:solidFill>
-                  <a:srgbClr val="CE5C00"/>
-                </a:solidFill>
-                <a:latin typeface="Consolas" panose="020B0609020204030204" pitchFamily="49" charset="0"/>
-              </a:rPr>
-              <a:t>+ </a:t>
-            </a:r>
-            <a:r>
-              <a:rPr lang="en-US" b="1" dirty="0">
-                <a:solidFill>
-                  <a:srgbClr val="000000"/>
-                </a:solidFill>
-                <a:latin typeface="Consolas" panose="020B0609020204030204" pitchFamily="49" charset="0"/>
-              </a:rPr>
-              <a:t>n)</a:t>
-            </a:r>
-          </a:p>
-        </p:txBody>
-      </p:sp>
-      <p:sp>
-        <p:nvSpPr>
-          <p:cNvPr id="3" name="Text Placeholder 2">
-            <a:extLst>
-              <a:ext uri="{FF2B5EF4-FFF2-40B4-BE49-F238E27FC236}">
-                <a16:creationId xmlns:a16="http://schemas.microsoft.com/office/drawing/2014/main" id="{A5E0AA9C-BD35-5A4E-A51E-14C08A02B049}"/>
-              </a:ext>
-            </a:extLst>
-          </p:cNvPr>
-          <p:cNvSpPr>
-            <a:spLocks noGrp="1"/>
-          </p:cNvSpPr>
-          <p:nvPr>
-            <p:ph type="body" sz="quarter" idx="12"/>
-          </p:nvPr>
-        </p:nvSpPr>
-        <p:spPr/>
-        <p:txBody>
-          <a:bodyPr/>
-          <a:lstStyle/>
-          <a:p>
-            <a:endParaRPr lang="en-US"/>
+              <a:rPr lang="en-US" dirty="0"/>
+              <a:t>python input-</a:t>
+            </a:r>
+            <a:r>
+              <a:rPr lang="en-US" dirty="0" err="1"/>
+              <a:t>name.py</a:t>
+            </a:r>
+            <a:endParaRPr lang="en-US" dirty="0"/>
           </a:p>
         </p:txBody>
       </p:sp>
     </p:spTree>
     <p:extLst>
       <p:ext uri="{BB962C8B-B14F-4D97-AF65-F5344CB8AC3E}">
-        <p14:creationId xmlns:p14="http://schemas.microsoft.com/office/powerpoint/2010/main" val="963706130"/>
+        <p14:creationId xmlns:p14="http://schemas.microsoft.com/office/powerpoint/2010/main" val="1066617227"/>
       </p:ext>
     </p:extLst>
   </p:cSld>
@@ -3319,10 +3196,10 @@
       </p:grpSpPr>
       <p:sp>
         <p:nvSpPr>
-          <p:cNvPr id="2" name="Content Placeholder 1">
+          <p:cNvPr id="2" name="Text Placeholder 1">
             <a:extLst>
               <a:ext uri="{FF2B5EF4-FFF2-40B4-BE49-F238E27FC236}">
-                <a16:creationId xmlns:a16="http://schemas.microsoft.com/office/drawing/2014/main" id="{F7E1A203-877D-A040-B541-D385A345D4F1}"/>
+                <a16:creationId xmlns:a16="http://schemas.microsoft.com/office/drawing/2014/main" id="{41DB1EB8-F065-FF4C-A169-C9FA64B4C154}"/>
               </a:ext>
             </a:extLst>
           </p:cNvPr>
@@ -3330,7 +3207,7 @@
             <a:spLocks noGrp="1"/>
           </p:cNvSpPr>
           <p:nvPr>
-            <p:ph sz="quarter" idx="10"/>
+            <p:ph type="body" sz="quarter" idx="11"/>
           </p:nvPr>
         </p:nvSpPr>
         <p:spPr/>
@@ -3339,21 +3216,138 @@
           <a:lstStyle/>
           <a:p>
             <a:r>
-              <a:rPr lang="en-US" dirty="0"/>
-              <a:t>python input-name-one-</a:t>
-            </a:r>
-            <a:r>
-              <a:rPr lang="en-US" dirty="0" err="1"/>
-              <a:t>line.py</a:t>
-            </a:r>
-            <a:endParaRPr lang="en-US" dirty="0"/>
+              <a:rPr lang="en-US" b="1" dirty="0">
+                <a:solidFill>
+                  <a:srgbClr val="000000"/>
+                </a:solidFill>
+                <a:latin typeface="Consolas" panose="020B0609020204030204" pitchFamily="49" charset="0"/>
+              </a:rPr>
+              <a:t>n </a:t>
+            </a:r>
+            <a:r>
+              <a:rPr lang="en-US" b="1" dirty="0">
+                <a:solidFill>
+                  <a:srgbClr val="CE5C00"/>
+                </a:solidFill>
+                <a:latin typeface="Consolas" panose="020B0609020204030204" pitchFamily="49" charset="0"/>
+              </a:rPr>
+              <a:t>= </a:t>
+            </a:r>
+            <a:r>
+              <a:rPr lang="en-US" b="1" dirty="0">
+                <a:solidFill>
+                  <a:srgbClr val="204A87"/>
+                </a:solidFill>
+                <a:latin typeface="Consolas" panose="020B0609020204030204" pitchFamily="49" charset="0"/>
+              </a:rPr>
+              <a:t>input</a:t>
+            </a:r>
+            <a:r>
+              <a:rPr lang="en-US" b="1" dirty="0">
+                <a:solidFill>
+                  <a:srgbClr val="000000"/>
+                </a:solidFill>
+                <a:latin typeface="Consolas" panose="020B0609020204030204" pitchFamily="49" charset="0"/>
+              </a:rPr>
+              <a:t>(</a:t>
+            </a:r>
+            <a:r>
+              <a:rPr lang="en-US" b="1" dirty="0">
+                <a:solidFill>
+                  <a:srgbClr val="4E9A06"/>
+                </a:solidFill>
+                <a:latin typeface="Consolas" panose="020B0609020204030204" pitchFamily="49" charset="0"/>
+              </a:rPr>
+              <a:t>'What is your name? '</a:t>
+            </a:r>
+            <a:r>
+              <a:rPr lang="en-US" b="1" dirty="0">
+                <a:solidFill>
+                  <a:srgbClr val="000000"/>
+                </a:solidFill>
+                <a:latin typeface="Consolas" panose="020B0609020204030204" pitchFamily="49" charset="0"/>
+              </a:rPr>
+              <a:t>)</a:t>
+            </a:r>
+          </a:p>
+          <a:p>
+            <a:r>
+              <a:rPr lang="en-US" b="1" dirty="0">
+                <a:solidFill>
+                  <a:srgbClr val="204A87"/>
+                </a:solidFill>
+                <a:latin typeface="Consolas" panose="020B0609020204030204" pitchFamily="49" charset="0"/>
+              </a:rPr>
+              <a:t>print</a:t>
+            </a:r>
+            <a:r>
+              <a:rPr lang="en-US" b="1" dirty="0">
+                <a:solidFill>
+                  <a:srgbClr val="000000"/>
+                </a:solidFill>
+                <a:latin typeface="Consolas" panose="020B0609020204030204" pitchFamily="49" charset="0"/>
+              </a:rPr>
+              <a:t>(</a:t>
+            </a:r>
+            <a:r>
+              <a:rPr lang="en-US" b="1" dirty="0">
+                <a:solidFill>
+                  <a:srgbClr val="4E9A06"/>
+                </a:solidFill>
+                <a:latin typeface="Consolas" panose="020B0609020204030204" pitchFamily="49" charset="0"/>
+              </a:rPr>
+              <a:t>'Thank you. Your name is: ' </a:t>
+            </a:r>
+            <a:r>
+              <a:rPr lang="en-US" b="1" dirty="0">
+                <a:solidFill>
+                  <a:srgbClr val="CE5C00"/>
+                </a:solidFill>
+                <a:latin typeface="Consolas" panose="020B0609020204030204" pitchFamily="49" charset="0"/>
+              </a:rPr>
+              <a:t>+ </a:t>
+            </a:r>
+            <a:r>
+              <a:rPr lang="en-US" b="1" dirty="0">
+                <a:solidFill>
+                  <a:srgbClr val="000000"/>
+                </a:solidFill>
+                <a:latin typeface="Consolas" panose="020B0609020204030204" pitchFamily="49" charset="0"/>
+              </a:rPr>
+              <a:t>n)</a:t>
+            </a:r>
+          </a:p>
+        </p:txBody>
+      </p:sp>
+      <p:sp>
+        <p:nvSpPr>
+          <p:cNvPr id="3" name="Text Placeholder 2">
+            <a:extLst>
+              <a:ext uri="{FF2B5EF4-FFF2-40B4-BE49-F238E27FC236}">
+                <a16:creationId xmlns:a16="http://schemas.microsoft.com/office/drawing/2014/main" id="{A5E0AA9C-BD35-5A4E-A51E-14C08A02B049}"/>
+              </a:ext>
+            </a:extLst>
+          </p:cNvPr>
+          <p:cNvSpPr>
+            <a:spLocks noGrp="1"/>
+          </p:cNvSpPr>
+          <p:nvPr>
+            <p:ph type="body" sz="quarter" idx="12"/>
+          </p:nvPr>
+        </p:nvSpPr>
+        <p:spPr/>
+        <p:txBody>
+          <a:bodyPr/>
+          <a:lstStyle/>
+          <a:p>
+            <a:endParaRPr lang="en-US"/>
           </a:p>
         </p:txBody>
       </p:sp>
     </p:spTree>
     <p:extLst>
       <p:ext uri="{BB962C8B-B14F-4D97-AF65-F5344CB8AC3E}">
-        <p14:creationId xmlns:p14="http://schemas.microsoft.com/office/powerpoint/2010/main" val="532455790"/>
+        <p14:creationId xmlns:p14="http://schemas.microsoft.com/office/powerpoint/2010/main" val="963706130"/>
       </p:ext>
     </p:extLst>
   </p:cSld>
@@ -3382,10 +3376,10 @@
       </p:grpSpPr>
       <p:sp>
         <p:nvSpPr>
-          <p:cNvPr id="2" name="Text Placeholder 1">
+          <p:cNvPr id="2" name="Content Placeholder 1">
             <a:extLst>
               <a:ext uri="{FF2B5EF4-FFF2-40B4-BE49-F238E27FC236}">
-                <a16:creationId xmlns:a16="http://schemas.microsoft.com/office/drawing/2014/main" id="{06E88012-EA37-4246-8DA9-19B4AF6595E1}"/>
+                <a16:creationId xmlns:a16="http://schemas.microsoft.com/office/drawing/2014/main" id="{F7E1A203-877D-A040-B541-D385A345D4F1}"/>
               </a:ext>
             </a:extLst>
           </p:cNvPr>
@@ -3393,54 +3387,30 @@
             <a:spLocks noGrp="1"/>
           </p:cNvSpPr>
           <p:nvPr>
-            <p:ph type="body" sz="quarter" idx="10"/>
-          </p:nvPr>
-        </p:nvSpPr>
-        <p:spPr>
-          <a:xfrm>
-            <a:off x="3344863" y="1143000"/>
-            <a:ext cx="7593012" cy="2177006"/>
-          </a:xfrm>
-        </p:spPr>
+            <p:ph sz="quarter" idx="10"/>
+          </p:nvPr>
+        </p:nvSpPr>
+        <p:spPr/>
         <p:txBody>
           <a:bodyPr/>
           <a:lstStyle/>
           <a:p>
             <a:r>
-              <a:rPr lang="en-US" dirty="0">
-                <a:solidFill>
-                  <a:schemeClr val="bg1"/>
-                </a:solidFill>
-              </a:rPr>
-              <a:t>3</a:t>
-            </a:r>
-          </a:p>
-          <a:p>
-            <a:r>
-              <a:rPr lang="en-US" dirty="0">
-                <a:solidFill>
-                  <a:schemeClr val="bg1"/>
-                </a:solidFill>
-              </a:rPr>
-              <a:t>CTECH401_M3_04</a:t>
-            </a:r>
-          </a:p>
-          <a:p>
-            <a:r>
-              <a:rPr lang="en-US" dirty="0">
-                <a:solidFill>
-                  <a:schemeClr val="bg1"/>
-                </a:solidFill>
-              </a:rPr>
-              <a:t>String Functions</a:t>
-            </a:r>
+              <a:rPr lang="en-US" dirty="0"/>
+              <a:t>python input-name-one-</a:t>
+            </a:r>
+            <a:r>
+              <a:rPr lang="en-US" dirty="0" err="1"/>
+              <a:t>line.py</a:t>
+            </a:r>
+            <a:endParaRPr lang="en-US" dirty="0"/>
           </a:p>
         </p:txBody>
       </p:sp>
     </p:spTree>
     <p:extLst>
       <p:ext uri="{BB962C8B-B14F-4D97-AF65-F5344CB8AC3E}">
-        <p14:creationId xmlns:p14="http://schemas.microsoft.com/office/powerpoint/2010/main" val="1188427211"/>
+        <p14:creationId xmlns:p14="http://schemas.microsoft.com/office/powerpoint/2010/main" val="532455790"/>
       </p:ext>
     </p:extLst>
   </p:cSld>
@@ -3472,7 +3442,7 @@
           <p:cNvPr id="2" name="Text Placeholder 1">
             <a:extLst>
               <a:ext uri="{FF2B5EF4-FFF2-40B4-BE49-F238E27FC236}">
-                <a16:creationId xmlns:a16="http://schemas.microsoft.com/office/drawing/2014/main" id="{73A66241-9456-0B4E-812C-D63506D21C8A}"/>
+                <a16:creationId xmlns:a16="http://schemas.microsoft.com/office/drawing/2014/main" id="{06E88012-EA37-4246-8DA9-19B4AF6595E1}"/>
               </a:ext>
             </a:extLst>
           </p:cNvPr>
@@ -3483,38 +3453,43 @@
             <p:ph type="body" sz="quarter" idx="10"/>
           </p:nvPr>
         </p:nvSpPr>
-        <p:spPr/>
+        <p:spPr>
+          <a:xfrm>
+            <a:off x="3344863" y="1143000"/>
+            <a:ext cx="7593012" cy="2177006"/>
+          </a:xfrm>
+        </p:spPr>
         <p:txBody>
           <a:bodyPr/>
           <a:lstStyle/>
           <a:p>
             <a:r>
-              <a:rPr lang="en-US" dirty="0"/>
-              <a:t>Now we're going to increase our string vocabulary with some string </a:t>
-            </a:r>
-            <a:r>
-              <a:rPr lang="en-US" i="1" dirty="0"/>
-              <a:t>functions</a:t>
-            </a:r>
-          </a:p>
-          <a:p>
-            <a:r>
-              <a:rPr lang="en-US" dirty="0"/>
-              <a:t>A function is the thing with parentheses: you give it some data and it computes a value.</a:t>
-            </a:r>
-          </a:p>
-          <a:p>
-            <a:r>
-              <a:rPr lang="en-US" dirty="0"/>
-              <a:t>For example, the </a:t>
-            </a:r>
-            <a:r>
-              <a:rPr lang="en-US" dirty="0" err="1"/>
-              <a:t>int</a:t>
-            </a:r>
-            <a:r>
-              <a:rPr lang="en-US" dirty="0"/>
-              <a:t>() function takes a string and returns the integer that the digits in the string represent</a:t>
+              <a:rPr lang="en-US" dirty="0">
+                <a:solidFill>
+                  <a:schemeClr val="bg1"/>
+                </a:solidFill>
+              </a:rPr>
+              <a:t>4</a:t>
+            </a:r>
+          </a:p>
+          <a:p>
+            <a:r>
+              <a:rPr lang="en-US" dirty="0">
+                <a:solidFill>
+                  <a:schemeClr val="bg1"/>
+                </a:solidFill>
+              </a:rPr>
+              <a:t>CTECH401_M3_04</a:t>
+            </a:r>
+          </a:p>
+          <a:p>
+            <a:r>
+              <a:rPr lang="en-US" dirty="0">
+                <a:solidFill>
+                  <a:schemeClr val="bg1"/>
+                </a:solidFill>
+              </a:rPr>
+              <a:t>String Functions</a:t>
             </a:r>
           </a:p>
         </p:txBody>
@@ -3522,7 +3497,7 @@
     </p:spTree>
     <p:extLst>
       <p:ext uri="{BB962C8B-B14F-4D97-AF65-F5344CB8AC3E}">
-        <p14:creationId xmlns:p14="http://schemas.microsoft.com/office/powerpoint/2010/main" val="2841112296"/>
+        <p14:creationId xmlns:p14="http://schemas.microsoft.com/office/powerpoint/2010/main" val="1188427211"/>
       </p:ext>
     </p:extLst>
   </p:cSld>
@@ -3551,10 +3526,10 @@
       </p:grpSpPr>
       <p:sp>
         <p:nvSpPr>
-          <p:cNvPr id="2" name="Content Placeholder 1">
+          <p:cNvPr id="2" name="Text Placeholder 1">
             <a:extLst>
               <a:ext uri="{FF2B5EF4-FFF2-40B4-BE49-F238E27FC236}">
-                <a16:creationId xmlns:a16="http://schemas.microsoft.com/office/drawing/2014/main" id="{A2EC1ABB-3D1E-6B4F-B7E3-F19891B5CBC8}"/>
+                <a16:creationId xmlns:a16="http://schemas.microsoft.com/office/drawing/2014/main" id="{73A66241-9456-0B4E-812C-D63506D21C8A}"/>
               </a:ext>
             </a:extLst>
           </p:cNvPr>
@@ -3562,7 +3537,7 @@
             <a:spLocks noGrp="1"/>
           </p:cNvSpPr>
           <p:nvPr>
-            <p:ph sz="quarter" idx="10"/>
+            <p:ph type="body" sz="quarter" idx="10"/>
           </p:nvPr>
         </p:nvSpPr>
         <p:spPr/>
@@ -3571,63 +3546,32 @@
           <a:lstStyle/>
           <a:p>
             <a:r>
+              <a:rPr lang="en-US" dirty="0"/>
+              <a:t>Now we're going to increase our string vocabulary with some string </a:t>
+            </a:r>
+            <a:r>
+              <a:rPr lang="en-US" i="1" dirty="0"/>
+              <a:t>functions</a:t>
+            </a:r>
+          </a:p>
+          <a:p>
+            <a:r>
+              <a:rPr lang="en-US" dirty="0"/>
+              <a:t>A function is the thing with parentheses: you give it some data and it computes a value.</a:t>
+            </a:r>
+          </a:p>
+          <a:p>
+            <a:r>
+              <a:rPr lang="en-US" dirty="0"/>
+              <a:t>For example, the </a:t>
+            </a:r>
+            <a:r>
               <a:rPr lang="en-US" dirty="0" err="1"/>
               <a:t>int</a:t>
             </a:r>
             <a:r>
               <a:rPr lang="en-US" dirty="0"/>
-              <a:t>('123')</a:t>
-            </a:r>
-          </a:p>
-          <a:p>
-            <a:endParaRPr lang="en-US" dirty="0"/>
-          </a:p>
-          <a:p>
-            <a:r>
-              <a:rPr lang="en-US" dirty="0"/>
-              <a:t>Notice: we gave </a:t>
-            </a:r>
-            <a:r>
-              <a:rPr lang="en-US" dirty="0" err="1"/>
-              <a:t>int</a:t>
-            </a:r>
-            <a:r>
-              <a:rPr lang="en-US" dirty="0"/>
-              <a:t> a string </a:t>
-            </a:r>
-            <a:r>
-              <a:rPr lang="en-US" i="1" dirty="0"/>
-              <a:t>in quotes</a:t>
-            </a:r>
-            <a:r>
-              <a:rPr lang="en-US" dirty="0"/>
-              <a:t> and it gave back an integer </a:t>
-            </a:r>
-            <a:r>
-              <a:rPr lang="en-US" i="1" dirty="0"/>
-              <a:t>without quotes</a:t>
-            </a:r>
-            <a:r>
-              <a:rPr lang="en-US" dirty="0"/>
-              <a:t>. This is where data types are important.</a:t>
-            </a:r>
-          </a:p>
-          <a:p>
-            <a:endParaRPr lang="en-US" dirty="0"/>
-          </a:p>
-          <a:p>
-            <a:r>
-              <a:rPr lang="en-US" dirty="0"/>
-              <a:t>'123' is a string: it has three characters: 1, 2, and 3.</a:t>
-            </a:r>
-          </a:p>
-          <a:p>
-            <a:endParaRPr lang="en-US" dirty="0"/>
-          </a:p>
-          <a:p>
-            <a:r>
-              <a:rPr lang="en-US" dirty="0"/>
-              <a:t>123 is an integer: one hundred and twenty three</a:t>
+              <a:t>() function takes a string and returns the integer that the digits in the string represent</a:t>
             </a:r>
           </a:p>
         </p:txBody>
@@ -3635,7 +3579,7 @@
     </p:spTree>
     <p:extLst>
       <p:ext uri="{BB962C8B-B14F-4D97-AF65-F5344CB8AC3E}">
-        <p14:creationId xmlns:p14="http://schemas.microsoft.com/office/powerpoint/2010/main" val="2155525521"/>
+        <p14:creationId xmlns:p14="http://schemas.microsoft.com/office/powerpoint/2010/main" val="2841112296"/>
       </p:ext>
     </p:extLst>
   </p:cSld>
@@ -3664,10 +3608,10 @@
       </p:grpSpPr>
       <p:sp>
         <p:nvSpPr>
-          <p:cNvPr id="2" name="Text Placeholder 1">
+          <p:cNvPr id="2" name="Content Placeholder 1">
             <a:extLst>
               <a:ext uri="{FF2B5EF4-FFF2-40B4-BE49-F238E27FC236}">
-                <a16:creationId xmlns:a16="http://schemas.microsoft.com/office/drawing/2014/main" id="{6091499A-C5E0-3140-9123-E2D0A7A60F4C}"/>
+                <a16:creationId xmlns:a16="http://schemas.microsoft.com/office/drawing/2014/main" id="{A2EC1ABB-3D1E-6B4F-B7E3-F19891B5CBC8}"/>
               </a:ext>
             </a:extLst>
           </p:cNvPr>
@@ -3675,7 +3619,7 @@
             <a:spLocks noGrp="1"/>
           </p:cNvSpPr>
           <p:nvPr>
-            <p:ph type="body" sz="quarter" idx="10"/>
+            <p:ph sz="quarter" idx="10"/>
           </p:nvPr>
         </p:nvSpPr>
         <p:spPr/>
@@ -3684,36 +3628,63 @@
           <a:lstStyle/>
           <a:p>
             <a:r>
-              <a:rPr lang="en-US" dirty="0"/>
-              <a:t>You might ask, is there a function that can do this in reverse? instead of taking a string and returning an integer, it takes an integer and returns a string?</a:t>
-            </a:r>
-          </a:p>
-          <a:p>
-            <a:r>
-              <a:rPr lang="en-US" dirty="0"/>
-              <a:t>Why, yes, there is. And if the function that converts to an integer is </a:t>
-            </a:r>
-            <a:r>
               <a:rPr lang="en-US" dirty="0" err="1"/>
               <a:t>int</a:t>
             </a:r>
             <a:r>
               <a:rPr lang="en-US" dirty="0"/>
-              <a:t>(), what do you think the function that converts to a s string is called?</a:t>
-            </a:r>
-          </a:p>
-          <a:p>
-            <a:r>
-              <a:rPr lang="en-US" dirty="0"/>
-              <a:t>That's right: it's </a:t>
+              <a:t>('123')</a:t>
+            </a:r>
+          </a:p>
+          <a:p>
+            <a:endParaRPr lang="en-US" dirty="0"/>
+          </a:p>
+          <a:p>
+            <a:r>
+              <a:rPr lang="en-US" dirty="0"/>
+              <a:t>Notice: we gave </a:t>
             </a:r>
             <a:r>
               <a:rPr lang="en-US" dirty="0" err="1"/>
-              <a:t>str</a:t>
-            </a:r>
-            <a:r>
-              <a:rPr lang="en-US" dirty="0"/>
-              <a:t>()</a:t>
+              <a:t>int</a:t>
+            </a:r>
+            <a:r>
+              <a:rPr lang="en-US" dirty="0"/>
+              <a:t> a string </a:t>
+            </a:r>
+            <a:r>
+              <a:rPr lang="en-US" i="1" dirty="0"/>
+              <a:t>in quotes</a:t>
+            </a:r>
+            <a:r>
+              <a:rPr lang="en-US" dirty="0"/>
+              <a:t> and it gave back an integer </a:t>
+            </a:r>
+            <a:r>
+              <a:rPr lang="en-US" i="1" dirty="0"/>
+              <a:t>without quotes</a:t>
+            </a:r>
+            <a:r>
+              <a:rPr lang="en-US" dirty="0"/>
+              <a:t>. This is where data types are important.</a:t>
+            </a:r>
+          </a:p>
+          <a:p>
+            <a:endParaRPr lang="en-US" dirty="0"/>
+          </a:p>
+          <a:p>
+            <a:r>
+              <a:rPr lang="en-US" dirty="0"/>
+              <a:t>'123' is a string: it has three characters: 1, 2, and 3.</a:t>
+            </a:r>
+          </a:p>
+          <a:p>
+            <a:endParaRPr lang="en-US" dirty="0"/>
+          </a:p>
+          <a:p>
+            <a:r>
+              <a:rPr lang="en-US" dirty="0"/>
+              <a:t>123 is an integer: one hundred and twenty three</a:t>
             </a:r>
           </a:p>
         </p:txBody>
@@ -3721,7 +3692,7 @@
     </p:spTree>
     <p:extLst>
       <p:ext uri="{BB962C8B-B14F-4D97-AF65-F5344CB8AC3E}">
-        <p14:creationId xmlns:p14="http://schemas.microsoft.com/office/powerpoint/2010/main" val="1306876500"/>
+        <p14:creationId xmlns:p14="http://schemas.microsoft.com/office/powerpoint/2010/main" val="2155525521"/>
       </p:ext>
     </p:extLst>
   </p:cSld>
@@ -3750,10 +3721,10 @@
       </p:grpSpPr>
       <p:sp>
         <p:nvSpPr>
-          <p:cNvPr id="2" name="Content Placeholder 1">
+          <p:cNvPr id="2" name="Text Placeholder 1">
             <a:extLst>
               <a:ext uri="{FF2B5EF4-FFF2-40B4-BE49-F238E27FC236}">
-                <a16:creationId xmlns:a16="http://schemas.microsoft.com/office/drawing/2014/main" id="{52BA5E76-D99C-6F42-863C-42AF12F61316}"/>
+                <a16:creationId xmlns:a16="http://schemas.microsoft.com/office/drawing/2014/main" id="{6091499A-C5E0-3140-9123-E2D0A7A60F4C}"/>
               </a:ext>
             </a:extLst>
           </p:cNvPr>
@@ -3761,7 +3732,7 @@
             <a:spLocks noGrp="1"/>
           </p:cNvSpPr>
           <p:nvPr>
-            <p:ph sz="quarter" idx="10"/>
+            <p:ph type="body" sz="quarter" idx="10"/>
           </p:nvPr>
         </p:nvSpPr>
         <p:spPr/>
@@ -3770,96 +3741,36 @@
           <a:lstStyle/>
           <a:p>
             <a:r>
+              <a:rPr lang="en-US" dirty="0"/>
+              <a:t>You might ask, is there a function that can do this in reverse? instead of taking a string and returning an integer, it takes an integer and returns a string?</a:t>
+            </a:r>
+          </a:p>
+          <a:p>
+            <a:r>
+              <a:rPr lang="en-US" dirty="0"/>
+              <a:t>Why, yes, there is. And if the function that converts to an integer is </a:t>
+            </a:r>
+            <a:r>
+              <a:rPr lang="en-US" dirty="0" err="1"/>
+              <a:t>int</a:t>
+            </a:r>
+            <a:r>
+              <a:rPr lang="en-US" dirty="0"/>
+              <a:t>(), what do you think the function that converts to a s string is called?</a:t>
+            </a:r>
+          </a:p>
+          <a:p>
+            <a:r>
+              <a:rPr lang="en-US" dirty="0"/>
+              <a:t>That's right: it's </a:t>
+            </a:r>
+            <a:r>
               <a:rPr lang="en-US" dirty="0" err="1"/>
               <a:t>str</a:t>
             </a:r>
             <a:r>
               <a:rPr lang="en-US" dirty="0"/>
-              <a:t>(123)</a:t>
-            </a:r>
-          </a:p>
-          <a:p>
-            <a:endParaRPr lang="en-US" dirty="0"/>
-          </a:p>
-          <a:p>
-            <a:r>
-              <a:rPr lang="en-US" dirty="0" err="1"/>
-              <a:t>str</a:t>
-            </a:r>
-            <a:r>
-              <a:rPr lang="en-US" dirty="0"/>
-              <a:t>() takes an integer, </a:t>
-            </a:r>
-            <a:r>
-              <a:rPr lang="en-US" i="1" dirty="0"/>
-              <a:t>without</a:t>
-            </a:r>
-            <a:r>
-              <a:rPr lang="en-US" dirty="0"/>
-              <a:t> quotes, and returns a string, </a:t>
-            </a:r>
-            <a:r>
-              <a:rPr lang="en-US" i="1" dirty="0"/>
-              <a:t>with </a:t>
-            </a:r>
-            <a:r>
-              <a:rPr lang="en-US" dirty="0"/>
-              <a:t>quotes</a:t>
-            </a:r>
-          </a:p>
-          <a:p>
-            <a:endParaRPr lang="en-US" dirty="0"/>
-          </a:p>
-          <a:p>
-            <a:r>
-              <a:rPr lang="en-US" dirty="0" err="1"/>
-              <a:t>str</a:t>
-            </a:r>
-            <a:r>
-              <a:rPr lang="en-US" dirty="0"/>
-              <a:t>(50000)</a:t>
-            </a:r>
-          </a:p>
-          <a:p>
-            <a:endParaRPr lang="en-US" dirty="0"/>
-          </a:p>
-          <a:p>
-            <a:r>
-              <a:rPr lang="en-US" dirty="0" err="1"/>
-              <a:t>str</a:t>
-            </a:r>
-            <a:r>
-              <a:rPr lang="en-US" dirty="0"/>
-              <a:t>(</a:t>
-            </a:r>
-            <a:r>
-              <a:rPr lang="en-US" dirty="0" err="1"/>
-              <a:t>int</a:t>
-            </a:r>
-            <a:r>
-              <a:rPr lang="en-US" dirty="0"/>
-              <a:t>('123'))</a:t>
-            </a:r>
-          </a:p>
-          <a:p>
-            <a:endParaRPr lang="en-US" dirty="0"/>
-          </a:p>
-          <a:p>
-            <a:r>
-              <a:rPr lang="en-US" dirty="0" err="1"/>
-              <a:t>int</a:t>
-            </a:r>
-            <a:r>
-              <a:rPr lang="en-US" dirty="0"/>
-              <a:t>(</a:t>
-            </a:r>
-            <a:r>
-              <a:rPr lang="en-US" dirty="0" err="1"/>
-              <a:t>str</a:t>
-            </a:r>
-            <a:r>
-              <a:rPr lang="en-US" dirty="0"/>
-              <a:t>(123))</a:t>
+              <a:t>()</a:t>
             </a:r>
           </a:p>
         </p:txBody>
@@ -3867,7 +3778,7 @@
     </p:spTree>
     <p:extLst>
       <p:ext uri="{BB962C8B-B14F-4D97-AF65-F5344CB8AC3E}">
-        <p14:creationId xmlns:p14="http://schemas.microsoft.com/office/powerpoint/2010/main" val="258443225"/>
+        <p14:creationId xmlns:p14="http://schemas.microsoft.com/office/powerpoint/2010/main" val="1306876500"/>
       </p:ext>
     </p:extLst>
   </p:cSld>
@@ -3896,6 +3807,152 @@
       </p:grpSpPr>
       <p:sp>
         <p:nvSpPr>
+          <p:cNvPr id="2" name="Content Placeholder 1">
+            <a:extLst>
+              <a:ext uri="{FF2B5EF4-FFF2-40B4-BE49-F238E27FC236}">
+                <a16:creationId xmlns:a16="http://schemas.microsoft.com/office/drawing/2014/main" id="{52BA5E76-D99C-6F42-863C-42AF12F61316}"/>
+              </a:ext>
+            </a:extLst>
+          </p:cNvPr>
+          <p:cNvSpPr>
+            <a:spLocks noGrp="1"/>
+          </p:cNvSpPr>
+          <p:nvPr>
+            <p:ph sz="quarter" idx="10"/>
+          </p:nvPr>
+        </p:nvSpPr>
+        <p:spPr/>
+        <p:txBody>
+          <a:bodyPr/>
+          <a:lstStyle/>
+          <a:p>
+            <a:r>
+              <a:rPr lang="en-US" dirty="0" err="1"/>
+              <a:t>str</a:t>
+            </a:r>
+            <a:r>
+              <a:rPr lang="en-US" dirty="0"/>
+              <a:t>(123)</a:t>
+            </a:r>
+          </a:p>
+          <a:p>
+            <a:endParaRPr lang="en-US" dirty="0"/>
+          </a:p>
+          <a:p>
+            <a:r>
+              <a:rPr lang="en-US" dirty="0" err="1"/>
+              <a:t>str</a:t>
+            </a:r>
+            <a:r>
+              <a:rPr lang="en-US" dirty="0"/>
+              <a:t>() takes an integer, </a:t>
+            </a:r>
+            <a:r>
+              <a:rPr lang="en-US" i="1" dirty="0"/>
+              <a:t>without</a:t>
+            </a:r>
+            <a:r>
+              <a:rPr lang="en-US" dirty="0"/>
+              <a:t> quotes, and returns a string, </a:t>
+            </a:r>
+            <a:r>
+              <a:rPr lang="en-US" i="1" dirty="0"/>
+              <a:t>with </a:t>
+            </a:r>
+            <a:r>
+              <a:rPr lang="en-US" dirty="0"/>
+              <a:t>quotes</a:t>
+            </a:r>
+          </a:p>
+          <a:p>
+            <a:endParaRPr lang="en-US" dirty="0"/>
+          </a:p>
+          <a:p>
+            <a:r>
+              <a:rPr lang="en-US" dirty="0" err="1"/>
+              <a:t>str</a:t>
+            </a:r>
+            <a:r>
+              <a:rPr lang="en-US" dirty="0"/>
+              <a:t>(50000)</a:t>
+            </a:r>
+          </a:p>
+          <a:p>
+            <a:endParaRPr lang="en-US" dirty="0"/>
+          </a:p>
+          <a:p>
+            <a:r>
+              <a:rPr lang="en-US" dirty="0" err="1"/>
+              <a:t>str</a:t>
+            </a:r>
+            <a:r>
+              <a:rPr lang="en-US" dirty="0"/>
+              <a:t>(</a:t>
+            </a:r>
+            <a:r>
+              <a:rPr lang="en-US" dirty="0" err="1"/>
+              <a:t>int</a:t>
+            </a:r>
+            <a:r>
+              <a:rPr lang="en-US" dirty="0"/>
+              <a:t>('123'))</a:t>
+            </a:r>
+          </a:p>
+          <a:p>
+            <a:endParaRPr lang="en-US" dirty="0"/>
+          </a:p>
+          <a:p>
+            <a:r>
+              <a:rPr lang="en-US" dirty="0" err="1"/>
+              <a:t>int</a:t>
+            </a:r>
+            <a:r>
+              <a:rPr lang="en-US" dirty="0"/>
+              <a:t>(</a:t>
+            </a:r>
+            <a:r>
+              <a:rPr lang="en-US" dirty="0" err="1"/>
+              <a:t>str</a:t>
+            </a:r>
+            <a:r>
+              <a:rPr lang="en-US" dirty="0"/>
+              <a:t>(123))</a:t>
+            </a:r>
+          </a:p>
+        </p:txBody>
+      </p:sp>
+    </p:spTree>
+    <p:extLst>
+      <p:ext uri="{BB962C8B-B14F-4D97-AF65-F5344CB8AC3E}">
+        <p14:creationId xmlns:p14="http://schemas.microsoft.com/office/powerpoint/2010/main" val="258443225"/>
+      </p:ext>
+    </p:extLst>
+  </p:cSld>
+  <p:clrMapOvr>
+    <a:masterClrMapping/>
+  </p:clrMapOvr>
+</p:sld>
+</file>
+
+<file path=ppt/slides/slide28.xml><?xml version="1.0" encoding="utf-8"?>
+<p:sld xmlns:a="http://schemas.openxmlformats.org/drawingml/2006/main" xmlns:r="http://schemas.openxmlformats.org/officeDocument/2006/relationships" xmlns:p="http://schemas.openxmlformats.org/presentationml/2006/main">
+  <p:cSld>
+    <p:spTree>
+      <p:nvGrpSpPr>
+        <p:cNvPr id="1" name=""/>
+        <p:cNvGrpSpPr/>
+        <p:nvPr/>
+      </p:nvGrpSpPr>
+      <p:grpSpPr>
+        <a:xfrm>
+          <a:off x="0" y="0"/>
+          <a:ext cx="0" cy="0"/>
+          <a:chOff x="0" y="0"/>
+          <a:chExt cx="0" cy="0"/>
+        </a:xfrm>
+      </p:grpSpPr>
+      <p:sp>
+        <p:nvSpPr>
           <p:cNvPr id="2" name="Text Placeholder 1">
             <a:extLst>
               <a:ext uri="{FF2B5EF4-FFF2-40B4-BE49-F238E27FC236}">
@@ -3943,7 +4000,7 @@
 </p:sld>
 </file>
 
-<file path=ppt/slides/slide28.xml><?xml version="1.0" encoding="utf-8"?>
+<file path=ppt/slides/slide29.xml><?xml version="1.0" encoding="utf-8"?>
 <p:sld xmlns:a="http://schemas.openxmlformats.org/drawingml/2006/main" xmlns:r="http://schemas.openxmlformats.org/officeDocument/2006/relationships" xmlns:p="http://schemas.openxmlformats.org/presentationml/2006/main">
   <p:cSld>
     <p:spTree>
@@ -4150,7 +4207,7 @@
           <p:cNvPr id="2" name="Text Placeholder 1">
             <a:extLst>
               <a:ext uri="{FF2B5EF4-FFF2-40B4-BE49-F238E27FC236}">
-                <a16:creationId xmlns:a16="http://schemas.microsoft.com/office/drawing/2014/main" id="{A7E5026B-3DBD-B64B-8BF4-C92D86DAB4BE}"/>
+                <a16:creationId xmlns:a16="http://schemas.microsoft.com/office/drawing/2014/main" id="{06E88012-EA37-4246-8DA9-19B4AF6595E1}"/>
               </a:ext>
             </a:extLst>
           </p:cNvPr>
@@ -4161,102 +4218,126 @@
             <p:ph type="body" sz="quarter" idx="10"/>
           </p:nvPr>
         </p:nvSpPr>
-        <p:spPr/>
+        <p:spPr>
+          <a:xfrm>
+            <a:off x="3344863" y="1143000"/>
+            <a:ext cx="7593012" cy="2177006"/>
+          </a:xfrm>
+        </p:spPr>
         <p:txBody>
           <a:bodyPr/>
           <a:lstStyle/>
           <a:p>
             <a:r>
-              <a:rPr lang="en-US" dirty="0"/>
-              <a:t>A string is made up of </a:t>
-            </a:r>
-            <a:r>
-              <a:rPr lang="en-US" i="1" dirty="0"/>
-              <a:t>characters</a:t>
-            </a:r>
-            <a:r>
-              <a:rPr lang="en-US" dirty="0"/>
-              <a:t> like letters, digits, spaces, punctuation, etc.</a:t>
-            </a:r>
-          </a:p>
-          <a:p>
-            <a:pPr lvl="1"/>
-            <a:r>
-              <a:rPr lang="en-US" dirty="0"/>
-              <a:t>They're like a string of beads, one after the next</a:t>
-            </a:r>
-          </a:p>
-          <a:p>
-            <a:r>
-              <a:rPr lang="en-US" dirty="0"/>
-              <a:t>Characters can be Roman letters: a, b, c, A, B, C</a:t>
-            </a:r>
-          </a:p>
-          <a:p>
-            <a:r>
-              <a:rPr lang="en-US" dirty="0"/>
-              <a:t>They can be accented: </a:t>
-            </a:r>
-            <a:r>
-              <a:rPr lang="en-US" dirty="0" err="1"/>
-              <a:t>é</a:t>
-            </a:r>
-            <a:r>
-              <a:rPr lang="en-US" dirty="0"/>
-              <a:t> or </a:t>
-            </a:r>
-            <a:r>
-              <a:rPr lang="en-US" dirty="0" err="1"/>
-              <a:t>ñ</a:t>
-            </a:r>
-            <a:r>
-              <a:rPr lang="en-US" dirty="0"/>
-              <a:t> or </a:t>
-            </a:r>
-            <a:r>
-              <a:rPr lang="en-US" dirty="0" err="1"/>
-              <a:t>ç</a:t>
-            </a:r>
-            <a:endParaRPr lang="en-US" dirty="0"/>
-          </a:p>
-          <a:p>
-            <a:r>
-              <a:rPr lang="en-US" dirty="0"/>
-              <a:t>Or in non-Roman alphabets: </a:t>
-            </a:r>
-            <a:r>
-              <a:rPr lang="en-US" dirty="0" err="1"/>
-              <a:t>ש</a:t>
-            </a:r>
-            <a:r>
-              <a:rPr lang="en-US" dirty="0"/>
-              <a:t>, </a:t>
-            </a:r>
-            <a:r>
-              <a:rPr lang="hi-IN" dirty="0"/>
-              <a:t>ऑ</a:t>
-            </a:r>
-            <a:r>
-              <a:rPr lang="en-US" dirty="0"/>
-              <a:t>, </a:t>
-            </a:r>
-          </a:p>
-          <a:p>
-            <a:r>
-              <a:rPr lang="en-US" dirty="0"/>
-              <a:t>Or an emoji: 😀</a:t>
-            </a:r>
-          </a:p>
-          <a:p>
-            <a:pPr lvl="1"/>
-            <a:endParaRPr lang="en-US" dirty="0"/>
+              <a:rPr lang="en-US" dirty="0">
+                <a:solidFill>
+                  <a:schemeClr val="bg1"/>
+                </a:solidFill>
+              </a:rPr>
+              <a:t>3</a:t>
+            </a:r>
+          </a:p>
+          <a:p>
+            <a:r>
+              <a:rPr lang="en-US" dirty="0">
+                <a:solidFill>
+                  <a:schemeClr val="bg1"/>
+                </a:solidFill>
+              </a:rPr>
+              <a:t>CTECH401_M3_02</a:t>
+            </a:r>
+          </a:p>
+          <a:p>
+            <a:r>
+              <a:rPr lang="en-US" dirty="0">
+                <a:solidFill>
+                  <a:schemeClr val="bg1"/>
+                </a:solidFill>
+              </a:rPr>
+              <a:t>Strings and Characters</a:t>
+            </a:r>
           </a:p>
         </p:txBody>
       </p:sp>
     </p:spTree>
     <p:extLst>
       <p:ext uri="{BB962C8B-B14F-4D97-AF65-F5344CB8AC3E}">
-        <p14:creationId xmlns:p14="http://schemas.microsoft.com/office/powerpoint/2010/main" val="3028760425"/>
+        <p14:creationId xmlns:p14="http://schemas.microsoft.com/office/powerpoint/2010/main" val="3710759850"/>
+      </p:ext>
+    </p:extLst>
+  </p:cSld>
+  <p:clrMapOvr>
+    <a:masterClrMapping/>
+  </p:clrMapOvr>
+</p:sld>
+</file>
+
+<file path=ppt/slides/slide30.xml><?xml version="1.0" encoding="utf-8"?>
+<p:sld xmlns:a="http://schemas.openxmlformats.org/drawingml/2006/main" xmlns:r="http://schemas.openxmlformats.org/officeDocument/2006/relationships" xmlns:p="http://schemas.openxmlformats.org/presentationml/2006/main">
+  <p:cSld>
+    <p:spTree>
+      <p:nvGrpSpPr>
+        <p:cNvPr id="1" name=""/>
+        <p:cNvGrpSpPr/>
+        <p:nvPr/>
+      </p:nvGrpSpPr>
+      <p:grpSpPr>
+        <a:xfrm>
+          <a:off x="0" y="0"/>
+          <a:ext cx="0" cy="0"/>
+          <a:chOff x="0" y="0"/>
+          <a:chExt cx="0" cy="0"/>
+        </a:xfrm>
+      </p:grpSpPr>
+      <p:sp>
+        <p:nvSpPr>
+          <p:cNvPr id="2" name="Content Placeholder 1">
+            <a:extLst>
+              <a:ext uri="{FF2B5EF4-FFF2-40B4-BE49-F238E27FC236}">
+                <a16:creationId xmlns:a16="http://schemas.microsoft.com/office/drawing/2014/main" id="{52BA5E76-D99C-6F42-863C-42AF12F61316}"/>
+              </a:ext>
+            </a:extLst>
+          </p:cNvPr>
+          <p:cNvSpPr>
+            <a:spLocks noGrp="1"/>
+          </p:cNvSpPr>
+          <p:nvPr>
+            <p:ph sz="quarter" idx="10"/>
+          </p:nvPr>
+        </p:nvSpPr>
+        <p:spPr/>
+        <p:txBody>
+          <a:bodyPr/>
+          <a:lstStyle/>
+          <a:p>
+            <a:r>
+              <a:rPr lang="en-US" dirty="0"/>
+              <a:t>If we tried to do this without the </a:t>
+            </a:r>
+            <a:r>
+              <a:rPr lang="en-US" dirty="0" err="1"/>
+              <a:t>str</a:t>
+            </a:r>
+            <a:r>
+              <a:rPr lang="en-US" dirty="0"/>
+              <a:t>(), there would be a problem. 'the number is' is a string, and 100 is an integer, so + can't combine them. We need to convert 100 to the string one zero zero using </a:t>
+            </a:r>
+            <a:r>
+              <a:rPr lang="en-US" dirty="0" err="1"/>
+              <a:t>str</a:t>
+            </a:r>
+            <a:r>
+              <a:rPr lang="en-US"/>
+              <a:t>() first.</a:t>
+            </a:r>
+            <a:endParaRPr lang="en-US" dirty="0"/>
+          </a:p>
+        </p:txBody>
+      </p:sp>
+    </p:spTree>
+    <p:extLst>
+      <p:ext uri="{BB962C8B-B14F-4D97-AF65-F5344CB8AC3E}">
+        <p14:creationId xmlns:p14="http://schemas.microsoft.com/office/powerpoint/2010/main" val="1114454191"/>
       </p:ext>
     </p:extLst>
   </p:cSld>
@@ -4288,7 +4369,7 @@
           <p:cNvPr id="2" name="Text Placeholder 1">
             <a:extLst>
               <a:ext uri="{FF2B5EF4-FFF2-40B4-BE49-F238E27FC236}">
-                <a16:creationId xmlns:a16="http://schemas.microsoft.com/office/drawing/2014/main" id="{5FBC9025-FA7E-3A44-94CE-589148E34D23}"/>
+                <a16:creationId xmlns:a16="http://schemas.microsoft.com/office/drawing/2014/main" id="{A7E5026B-3DBD-B64B-8BF4-C92D86DAB4BE}"/>
               </a:ext>
             </a:extLst>
           </p:cNvPr>
@@ -4306,47 +4387,95 @@
           <a:p>
             <a:r>
               <a:rPr lang="en-US" dirty="0"/>
-              <a:t>'Hello' is a string with five characters</a:t>
-            </a:r>
-          </a:p>
-          <a:p>
-            <a:r>
-              <a:rPr lang="en-US" dirty="0"/>
-              <a:t>'Hi, there!' is a string with nine characters (the comma, space, and exclamation point all count)</a:t>
-            </a:r>
-          </a:p>
-          <a:p>
-            <a:r>
-              <a:rPr lang="en-US" dirty="0"/>
-              <a:t>'😀' is a string with one character: the grinning face emoji</a:t>
-            </a:r>
-          </a:p>
-          <a:p>
-            <a:r>
-              <a:rPr lang="en-US" dirty="0"/>
-              <a:t>' ' is a string with one character: a space</a:t>
-            </a:r>
-          </a:p>
-          <a:p>
-            <a:r>
-              <a:rPr lang="en-US" dirty="0"/>
-              <a:t>'' is a string with zero characters: the </a:t>
+              <a:t>A string is made up of </a:t>
             </a:r>
             <a:r>
               <a:rPr lang="en-US" i="1" dirty="0"/>
-              <a:t>empty </a:t>
-            </a:r>
-            <a:r>
-              <a:rPr lang="en-US" dirty="0"/>
-              <a:t>string (which is different from a space)</a:t>
-            </a:r>
+              <a:t>characters</a:t>
+            </a:r>
+            <a:r>
+              <a:rPr lang="en-US" dirty="0"/>
+              <a:t> like letters, digits, spaces, punctuation, etc.</a:t>
+            </a:r>
+          </a:p>
+          <a:p>
+            <a:pPr lvl="1"/>
+            <a:r>
+              <a:rPr lang="en-US" dirty="0"/>
+              <a:t>They're like a string of beads, one after the next</a:t>
+            </a:r>
+          </a:p>
+          <a:p>
+            <a:r>
+              <a:rPr lang="en-US" dirty="0"/>
+              <a:t>Characters can be Roman letters: a, b, c, A, B, C</a:t>
+            </a:r>
+          </a:p>
+          <a:p>
+            <a:r>
+              <a:rPr lang="en-US" dirty="0"/>
+              <a:t>They can be accented: </a:t>
+            </a:r>
+            <a:r>
+              <a:rPr lang="en-US" dirty="0" err="1"/>
+              <a:t>é</a:t>
+            </a:r>
+            <a:r>
+              <a:rPr lang="en-US" dirty="0"/>
+              <a:t> or </a:t>
+            </a:r>
+            <a:r>
+              <a:rPr lang="en-US" dirty="0" err="1"/>
+              <a:t>ñ</a:t>
+            </a:r>
+            <a:r>
+              <a:rPr lang="en-US" dirty="0"/>
+              <a:t> or </a:t>
+            </a:r>
+            <a:r>
+              <a:rPr lang="en-US" dirty="0" err="1"/>
+              <a:t>ç</a:t>
+            </a:r>
+            <a:endParaRPr lang="en-US" dirty="0"/>
+          </a:p>
+          <a:p>
+            <a:r>
+              <a:rPr lang="en-US" dirty="0"/>
+              <a:t>Or in non-Roman alphabets: </a:t>
+            </a:r>
+            <a:r>
+              <a:rPr lang="en-US" dirty="0" err="1"/>
+              <a:t>ש</a:t>
+            </a:r>
+            <a:r>
+              <a:rPr lang="en-US" dirty="0"/>
+              <a:t>, </a:t>
+            </a:r>
+            <a:r>
+              <a:rPr lang="hi-IN" dirty="0"/>
+              <a:t>ऑ</a:t>
+            </a:r>
+            <a:r>
+              <a:rPr lang="en-US" dirty="0"/>
+              <a:t>, </a:t>
+            </a:r>
+          </a:p>
+          <a:p>
+            <a:r>
+              <a:rPr lang="en-US" dirty="0"/>
+              <a:t>Or an emoji: 😀 🚠</a:t>
+            </a:r>
+          </a:p>
+          <a:p>
+            <a:pPr lvl="1"/>
+            <a:endParaRPr lang="en-US" dirty="0"/>
           </a:p>
         </p:txBody>
       </p:sp>
     </p:spTree>
     <p:extLst>
       <p:ext uri="{BB962C8B-B14F-4D97-AF65-F5344CB8AC3E}">
-        <p14:creationId xmlns:p14="http://schemas.microsoft.com/office/powerpoint/2010/main" val="2745149829"/>
+        <p14:creationId xmlns:p14="http://schemas.microsoft.com/office/powerpoint/2010/main" val="3028760425"/>
       </p:ext>
     </p:extLst>
   </p:cSld>
@@ -4378,7 +4507,7 @@
           <p:cNvPr id="2" name="Text Placeholder 1">
             <a:extLst>
               <a:ext uri="{FF2B5EF4-FFF2-40B4-BE49-F238E27FC236}">
-                <a16:creationId xmlns:a16="http://schemas.microsoft.com/office/drawing/2014/main" id="{64536C3A-BA28-6941-80B4-CB676A681788}"/>
+                <a16:creationId xmlns:a16="http://schemas.microsoft.com/office/drawing/2014/main" id="{5FBC9025-FA7E-3A44-94CE-589148E34D23}"/>
               </a:ext>
             </a:extLst>
           </p:cNvPr>
@@ -4391,46 +4520,44 @@
         </p:nvSpPr>
         <p:spPr/>
         <p:txBody>
-          <a:bodyPr>
-            <a:normAutofit lnSpcReduction="10000"/>
-          </a:bodyPr>
+          <a:bodyPr/>
           <a:lstStyle/>
           <a:p>
             <a:r>
               <a:rPr lang="en-US" dirty="0"/>
-              <a:t>Strings in Python are enclosed in single quotes</a:t>
-            </a:r>
-          </a:p>
-          <a:p>
-            <a:pPr lvl="1"/>
-            <a:r>
-              <a:rPr lang="en-US" dirty="0"/>
-              <a:t>'Hello world!'</a:t>
-            </a:r>
-          </a:p>
-          <a:p>
-            <a:r>
-              <a:rPr lang="en-US" dirty="0"/>
-              <a:t>Double quotes are also okay</a:t>
-            </a:r>
-          </a:p>
-          <a:p>
-            <a:pPr lvl="1"/>
-            <a:r>
-              <a:rPr lang="en-US" dirty="0"/>
-              <a:t>but you have to be consistent: you can't start a string with a single quote and end with a double, or vice versa</a:t>
-            </a:r>
-          </a:p>
-          <a:p>
-            <a:r>
-              <a:rPr lang="en-US" dirty="0"/>
-              <a:t>We'll stick to single quotes, since that's how the Python interpreter prints strings</a:t>
-            </a:r>
-          </a:p>
-          <a:p>
-            <a:r>
-              <a:rPr lang="en-US" dirty="0"/>
-              <a:t>Avoid smart quotes! Don't code in a program like Word that auto-"corrects" to insert them</a:t>
+              <a:t>'Hello' is a string with five characters</a:t>
+            </a:r>
+          </a:p>
+          <a:p>
+            <a:r>
+              <a:rPr lang="en-US" dirty="0"/>
+              <a:t>'Hi, there!' is a string with nine characters (the comma, space, and exclamation point all count)</a:t>
+            </a:r>
+          </a:p>
+          <a:p>
+            <a:r>
+              <a:rPr lang="en-US" dirty="0"/>
+              <a:t>'😀' is a string with one character: the grinning face emoji</a:t>
+            </a:r>
+          </a:p>
+          <a:p>
+            <a:r>
+              <a:rPr lang="en-US" dirty="0"/>
+              <a:t>' ' is a string with one character: a space</a:t>
+            </a:r>
+          </a:p>
+          <a:p>
+            <a:r>
+              <a:rPr lang="en-US" dirty="0"/>
+              <a:t>'' is a string with zero characters: the </a:t>
+            </a:r>
+            <a:r>
+              <a:rPr lang="en-US" i="1" dirty="0"/>
+              <a:t>empty </a:t>
+            </a:r>
+            <a:r>
+              <a:rPr lang="en-US" dirty="0"/>
+              <a:t>string (which is different from a space)</a:t>
             </a:r>
           </a:p>
         </p:txBody>
@@ -4438,7 +4565,7 @@
     </p:spTree>
     <p:extLst>
       <p:ext uri="{BB962C8B-B14F-4D97-AF65-F5344CB8AC3E}">
-        <p14:creationId xmlns:p14="http://schemas.microsoft.com/office/powerpoint/2010/main" val="2965177643"/>
+        <p14:creationId xmlns:p14="http://schemas.microsoft.com/office/powerpoint/2010/main" val="2745149829"/>
       </p:ext>
     </p:extLst>
   </p:cSld>
@@ -4470,7 +4597,7 @@
           <p:cNvPr id="2" name="Text Placeholder 1">
             <a:extLst>
               <a:ext uri="{FF2B5EF4-FFF2-40B4-BE49-F238E27FC236}">
-                <a16:creationId xmlns:a16="http://schemas.microsoft.com/office/drawing/2014/main" id="{A57BB6C4-AD99-2F4B-A3C1-4C9C9C961F99}"/>
+                <a16:creationId xmlns:a16="http://schemas.microsoft.com/office/drawing/2014/main" id="{64536C3A-BA28-6941-80B4-CB676A681788}"/>
               </a:ext>
             </a:extLst>
           </p:cNvPr>
@@ -4483,12 +4610,69 @@
         </p:nvSpPr>
         <p:spPr/>
         <p:txBody>
-          <a:bodyPr/>
+          <a:bodyPr>
+            <a:normAutofit fontScale="92500"/>
+          </a:bodyPr>
           <a:lstStyle/>
           <a:p>
             <a:r>
               <a:rPr lang="en-US" dirty="0"/>
-              <a:t>What if the string you want has a single quote in it?</a:t>
+              <a:t>Strings in Python are enclosed in single quotes</a:t>
+            </a:r>
+          </a:p>
+          <a:p>
+            <a:pPr lvl="1"/>
+            <a:r>
+              <a:rPr lang="en-US" dirty="0"/>
+              <a:t>'Hello world!'</a:t>
+            </a:r>
+          </a:p>
+          <a:p>
+            <a:pPr lvl="1"/>
+            <a:r>
+              <a:rPr lang="en-US" dirty="0"/>
+              <a:t>These are string </a:t>
+            </a:r>
+            <a:r>
+              <a:rPr lang="en-US" i="1" dirty="0"/>
+              <a:t>literals</a:t>
+            </a:r>
+            <a:r>
+              <a:rPr lang="en-US" dirty="0"/>
+              <a:t>: what is between the quotes is </a:t>
+            </a:r>
+            <a:r>
+              <a:rPr lang="en-US" i="1" dirty="0"/>
+              <a:t>literally</a:t>
+            </a:r>
+            <a:r>
+              <a:rPr lang="en-US" dirty="0"/>
+              <a:t> the characters in the string, not more Python code</a:t>
+            </a:r>
+          </a:p>
+          <a:p>
+            <a:r>
+              <a:rPr lang="en-US" dirty="0"/>
+              <a:t>Double quotes are also okay</a:t>
+            </a:r>
+          </a:p>
+          <a:p>
+            <a:pPr lvl="1"/>
+            <a:r>
+              <a:rPr lang="en-US" dirty="0"/>
+              <a:t>but you have to be consistent: you can't start a string with a single quote and end with a double, or vice versa</a:t>
+            </a:r>
+          </a:p>
+          <a:p>
+            <a:r>
+              <a:rPr lang="en-US" dirty="0"/>
+              <a:t>We'll stick to single quotes, since that's how the Python interpreter prints strings</a:t>
+            </a:r>
+          </a:p>
+          <a:p>
+            <a:r>
+              <a:rPr lang="en-US" dirty="0"/>
+              <a:t>Avoid smart quotes! Don't code in a program like Word that auto-"corrects" to insert them</a:t>
             </a:r>
           </a:p>
         </p:txBody>
@@ -4496,7 +4680,7 @@
     </p:spTree>
     <p:extLst>
       <p:ext uri="{BB962C8B-B14F-4D97-AF65-F5344CB8AC3E}">
-        <p14:creationId xmlns:p14="http://schemas.microsoft.com/office/powerpoint/2010/main" val="455630379"/>
+        <p14:creationId xmlns:p14="http://schemas.microsoft.com/office/powerpoint/2010/main" val="2965177643"/>
       </p:ext>
     </p:extLst>
   </p:cSld>
@@ -4525,10 +4709,10 @@
       </p:grpSpPr>
       <p:sp>
         <p:nvSpPr>
-          <p:cNvPr id="2" name="Content Placeholder 1">
+          <p:cNvPr id="2" name="Text Placeholder 1">
             <a:extLst>
               <a:ext uri="{FF2B5EF4-FFF2-40B4-BE49-F238E27FC236}">
-                <a16:creationId xmlns:a16="http://schemas.microsoft.com/office/drawing/2014/main" id="{3AF86B77-AE1B-BA4E-8C71-B84D57C20118}"/>
+                <a16:creationId xmlns:a16="http://schemas.microsoft.com/office/drawing/2014/main" id="{A57BB6C4-AD99-2F4B-A3C1-4C9C9C961F99}"/>
               </a:ext>
             </a:extLst>
           </p:cNvPr>
@@ -4536,46 +4720,17 @@
             <a:spLocks noGrp="1"/>
           </p:cNvSpPr>
           <p:nvPr>
-            <p:ph sz="quarter" idx="10"/>
+            <p:ph type="body" sz="quarter" idx="10"/>
           </p:nvPr>
         </p:nvSpPr>
         <p:spPr/>
         <p:txBody>
-          <a:bodyPr>
-            <a:normAutofit lnSpcReduction="10000"/>
-          </a:bodyPr>
+          <a:bodyPr/>
           <a:lstStyle/>
           <a:p>
             <a:r>
               <a:rPr lang="en-US" dirty="0"/>
-              <a:t>print('I don't care')</a:t>
-            </a:r>
-          </a:p>
-          <a:p>
-            <a:endParaRPr lang="en-US" dirty="0"/>
-          </a:p>
-          <a:p>
-            <a:r>
-              <a:rPr lang="en-US" i="1" dirty="0"/>
-              <a:t>That doesn't work, since Python thinks the string ends at the single quote after the n and doesn't know what to do with the t care</a:t>
-            </a:r>
-          </a:p>
-          <a:p>
-            <a:endParaRPr lang="en-US" dirty="0"/>
-          </a:p>
-          <a:p>
-            <a:r>
-              <a:rPr lang="en-US" dirty="0"/>
-              <a:t>print('I don\'t care')</a:t>
-            </a:r>
-          </a:p>
-          <a:p>
-            <a:endParaRPr lang="en-US" dirty="0"/>
-          </a:p>
-          <a:p>
-            <a:r>
-              <a:rPr lang="en-US" i="1" dirty="0"/>
-              <a:t>To fix it, you need to 'escape' the single quote by putting backslash in front of it. That tells Python, "the next character is literally a single quote that's part of the string, not the end of the string"</a:t>
+              <a:t>What if the string you want has a single quote in it?</a:t>
             </a:r>
           </a:p>
         </p:txBody>
@@ -4583,7 +4738,7 @@
     </p:spTree>
     <p:extLst>
       <p:ext uri="{BB962C8B-B14F-4D97-AF65-F5344CB8AC3E}">
-        <p14:creationId xmlns:p14="http://schemas.microsoft.com/office/powerpoint/2010/main" val="3521612871"/>
+        <p14:creationId xmlns:p14="http://schemas.microsoft.com/office/powerpoint/2010/main" val="455630379"/>
       </p:ext>
     </p:extLst>
   </p:cSld>
@@ -4612,10 +4767,10 @@
       </p:grpSpPr>
       <p:sp>
         <p:nvSpPr>
-          <p:cNvPr id="2" name="Text Placeholder 1">
+          <p:cNvPr id="2" name="Content Placeholder 1">
             <a:extLst>
               <a:ext uri="{FF2B5EF4-FFF2-40B4-BE49-F238E27FC236}">
-                <a16:creationId xmlns:a16="http://schemas.microsoft.com/office/drawing/2014/main" id="{06E88012-EA37-4246-8DA9-19B4AF6595E1}"/>
+                <a16:creationId xmlns:a16="http://schemas.microsoft.com/office/drawing/2014/main" id="{3AF86B77-AE1B-BA4E-8C71-B84D57C20118}"/>
               </a:ext>
             </a:extLst>
           </p:cNvPr>
@@ -4623,46 +4778,46 @@
             <a:spLocks noGrp="1"/>
           </p:cNvSpPr>
           <p:nvPr>
-            <p:ph type="body" sz="quarter" idx="10"/>
-          </p:nvPr>
-        </p:nvSpPr>
-        <p:spPr>
-          <a:xfrm>
-            <a:off x="3344863" y="1143000"/>
-            <a:ext cx="7593012" cy="2177006"/>
-          </a:xfrm>
-        </p:spPr>
-        <p:txBody>
-          <a:bodyPr/>
+            <p:ph sz="quarter" idx="10"/>
+          </p:nvPr>
+        </p:nvSpPr>
+        <p:spPr/>
+        <p:txBody>
+          <a:bodyPr>
+            <a:normAutofit lnSpcReduction="10000"/>
+          </a:bodyPr>
           <a:lstStyle/>
           <a:p>
             <a:r>
-              <a:rPr lang="en-US" dirty="0">
-                <a:solidFill>
-                  <a:schemeClr val="bg1"/>
-                </a:solidFill>
-              </a:rPr>
-              <a:t>3</a:t>
-            </a:r>
-          </a:p>
-          <a:p>
-            <a:r>
-              <a:rPr lang="en-US" dirty="0">
-                <a:solidFill>
-                  <a:schemeClr val="bg1"/>
-                </a:solidFill>
-              </a:rPr>
-              <a:t>CTECH401_M3_03</a:t>
-            </a:r>
-          </a:p>
-          <a:p>
-            <a:r>
-              <a:rPr lang="en-US" dirty="0">
-                <a:solidFill>
-                  <a:schemeClr val="bg1"/>
-                </a:solidFill>
-              </a:rPr>
-              <a:t>String Operators</a:t>
+              <a:rPr lang="en-US" dirty="0"/>
+              <a:t>print('I don't care')</a:t>
+            </a:r>
+          </a:p>
+          <a:p>
+            <a:endParaRPr lang="en-US" dirty="0"/>
+          </a:p>
+          <a:p>
+            <a:r>
+              <a:rPr lang="en-US" i="1" dirty="0"/>
+              <a:t>That doesn't work, since Python thinks the string ends at the single quote after the n and doesn't know what to do with the t care</a:t>
+            </a:r>
+          </a:p>
+          <a:p>
+            <a:endParaRPr lang="en-US" dirty="0"/>
+          </a:p>
+          <a:p>
+            <a:r>
+              <a:rPr lang="en-US" dirty="0"/>
+              <a:t>print('I don\'t care')</a:t>
+            </a:r>
+          </a:p>
+          <a:p>
+            <a:endParaRPr lang="en-US" dirty="0"/>
+          </a:p>
+          <a:p>
+            <a:r>
+              <a:rPr lang="en-US" i="1" dirty="0"/>
+              <a:t>To fix it, you need to 'escape' the single quote by putting backslash in front of it. That tells Python, "the next character is literally a single quote that's part of the string, not the end of the string"</a:t>
             </a:r>
           </a:p>
         </p:txBody>
@@ -4670,7 +4825,7 @@
     </p:spTree>
     <p:extLst>
       <p:ext uri="{BB962C8B-B14F-4D97-AF65-F5344CB8AC3E}">
-        <p14:creationId xmlns:p14="http://schemas.microsoft.com/office/powerpoint/2010/main" val="3494650773"/>
+        <p14:creationId xmlns:p14="http://schemas.microsoft.com/office/powerpoint/2010/main" val="3521612871"/>
       </p:ext>
     </p:extLst>
   </p:cSld>
@@ -4702,7 +4857,7 @@
           <p:cNvPr id="2" name="Text Placeholder 1">
             <a:extLst>
               <a:ext uri="{FF2B5EF4-FFF2-40B4-BE49-F238E27FC236}">
-                <a16:creationId xmlns:a16="http://schemas.microsoft.com/office/drawing/2014/main" id="{935EC1D1-776B-6F48-B5DE-C5D21AF63E14}"/>
+                <a16:creationId xmlns:a16="http://schemas.microsoft.com/office/drawing/2014/main" id="{06E88012-EA37-4246-8DA9-19B4AF6595E1}"/>
               </a:ext>
             </a:extLst>
           </p:cNvPr>
@@ -4713,42 +4868,43 @@
             <p:ph type="body" sz="quarter" idx="10"/>
           </p:nvPr>
         </p:nvSpPr>
-        <p:spPr/>
+        <p:spPr>
+          <a:xfrm>
+            <a:off x="3344863" y="1143000"/>
+            <a:ext cx="7593012" cy="2177006"/>
+          </a:xfrm>
+        </p:spPr>
         <p:txBody>
           <a:bodyPr/>
           <a:lstStyle/>
           <a:p>
             <a:r>
-              <a:rPr lang="en-US" dirty="0"/>
-              <a:t>Now we can do interesting things with strings</a:t>
-            </a:r>
-          </a:p>
-          <a:p>
-            <a:r>
-              <a:rPr lang="en-US" dirty="0"/>
-              <a:t>+ is an </a:t>
-            </a:r>
-            <a:r>
-              <a:rPr lang="en-US" i="1" dirty="0"/>
-              <a:t>addition</a:t>
-            </a:r>
-            <a:r>
-              <a:rPr lang="en-US" dirty="0"/>
-              <a:t> operator for numbers: it combines two numbers into one </a:t>
-            </a:r>
-          </a:p>
-          <a:p>
-            <a:r>
-              <a:rPr lang="en-US" dirty="0"/>
-              <a:t>+ is a </a:t>
-            </a:r>
-            <a:r>
-              <a:rPr lang="en-US" i="1" dirty="0"/>
-              <a:t>concatenation</a:t>
-            </a:r>
-            <a:r>
-              <a:rPr lang="en-US" dirty="0"/>
-              <a:t> operator for strings: it combines two strings into one</a:t>
+              <a:rPr lang="en-US" dirty="0">
+                <a:solidFill>
+                  <a:schemeClr val="bg1"/>
+                </a:solidFill>
+              </a:rPr>
+              <a:t>3</a:t>
+            </a:r>
+          </a:p>
+          <a:p>
+            <a:r>
+              <a:rPr lang="en-US" dirty="0">
+                <a:solidFill>
+                  <a:schemeClr val="bg1"/>
+                </a:solidFill>
+              </a:rPr>
+              <a:t>CTECH401_M3_03</a:t>
+            </a:r>
+          </a:p>
+          <a:p>
+            <a:r>
+              <a:rPr lang="en-US" dirty="0">
+                <a:solidFill>
+                  <a:schemeClr val="bg1"/>
+                </a:solidFill>
+              </a:rPr>
+              <a:t>String Operators</a:t>
             </a:r>
           </a:p>
         </p:txBody>
@@ -4756,7 +4912,7 @@
     </p:spTree>
     <p:extLst>
       <p:ext uri="{BB962C8B-B14F-4D97-AF65-F5344CB8AC3E}">
-        <p14:creationId xmlns:p14="http://schemas.microsoft.com/office/powerpoint/2010/main" val="2284984678"/>
+        <p14:creationId xmlns:p14="http://schemas.microsoft.com/office/powerpoint/2010/main" val="3494650773"/>
       </p:ext>
     </p:extLst>
   </p:cSld>

</xml_diff>